<commit_message>
Some minor updates ...
</commit_message>
<xml_diff>
--- a/presentations/Alarma.pptx
+++ b/presentations/Alarma.pptx
@@ -4,6 +4,9 @@
   <p:sldMasterIdLst>
     <p:sldMasterId id="2147483648" r:id="rId1"/>
   </p:sldMasterIdLst>
+  <p:notesMasterIdLst>
+    <p:notesMasterId r:id="rId13"/>
+  </p:notesMasterIdLst>
   <p:sldIdLst>
     <p:sldId id="256" r:id="rId2"/>
     <p:sldId id="257" r:id="rId3"/>
@@ -17,10 +20,7 @@
     <p:sldId id="265" r:id="rId11"/>
     <p:sldId id="266" r:id="rId12"/>
   </p:sldIdLst>
-  <p:notesMasterIdLst>
-    <p:notesMasterId r:id="rId13"/>
-  </p:notesMasterIdLst>
-  <p:sldSz cx="9144000" cy="5143500"/>
+  <p:sldSz cx="9144000" cy="5143500" type="screen16x9"/>
   <p:notesSz cx="5143500" cy="9144000"/>
   <p:defaultTextStyle>
     <a:lvl1pPr marL="0" algn="l" defTabSz="914400" rtl="0" eaLnBrk="1" latinLnBrk="0" hangingPunct="1">
@@ -114,6 +114,11 @@
       </a:defRPr>
     </a:lvl9pPr>
   </p:defaultTextStyle>
+  <p:extLst>
+    <p:ext uri="{EFAFB233-063F-42B5-8137-9DF3F51BA10A}">
+      <p15:sldGuideLst xmlns:p15="http://schemas.microsoft.com/office/powerpoint/2012/main"/>
+    </p:ext>
+  </p:extLst>
 </p:presentation>
 </file>
 
@@ -139,234 +144,10 @@
           <a:chExt cx="0" cy="0"/>
         </a:xfrm>
       </p:grpSpPr>
-      <p:sp>
-        <p:nvSpPr>
-          <p:cNvPr id="2" name="Header Placeholder 1"/>
-          <p:cNvSpPr>
-            <a:spLocks noGrp="1"/>
-          </p:cNvSpPr>
-          <p:nvPr>
-            <p:ph type="hdr" sz="quarter"/>
-          </p:nvPr>
-        </p:nvSpPr>
-        <p:spPr>
-          <a:xfrm>
-            <a:off x="0" y="0"/>
-            <a:ext cx="2971800" cy="458788"/>
-          </a:xfrm>
-          <a:prstGeom prst="rect">
-            <a:avLst/>
-          </a:prstGeom>
-        </p:spPr>
-        <p:txBody>
-          <a:bodyPr vert="horz" lIns="91440" tIns="45720" rIns="91440" bIns="45720" rtlCol="0"/>
-          <a:lstStyle>
-            <a:lvl1pPr algn="l">
-              <a:defRPr sz="1200"/>
-            </a:lvl1pPr>
-          </a:lstStyle>
-          <a:p>
-            <a:endParaRPr lang="en-US"/>
-          </a:p>
-        </p:txBody>
-      </p:sp>
-      <p:sp>
-        <p:nvSpPr>
-          <p:cNvPr id="3" name="Date Placeholder 2"/>
-          <p:cNvSpPr>
-            <a:spLocks noGrp="1"/>
-          </p:cNvSpPr>
-          <p:nvPr>
-            <p:ph type="dt" idx="1"/>
-          </p:nvPr>
-        </p:nvSpPr>
-        <p:spPr>
-          <a:xfrm>
-            <a:off x="3884613" y="0"/>
-            <a:ext cx="2971800" cy="458788"/>
-          </a:xfrm>
-          <a:prstGeom prst="rect">
-            <a:avLst/>
-          </a:prstGeom>
-        </p:spPr>
-        <p:txBody>
-          <a:bodyPr vert="horz" lIns="91440" tIns="45720" rIns="91440" bIns="45720" rtlCol="0"/>
-          <a:lstStyle>
-            <a:lvl1pPr algn="r">
-              <a:defRPr sz="1200"/>
-            </a:lvl1pPr>
-          </a:lstStyle>
-          <a:p>
-            <a:fld id="{5282F153-3F37-0F45-9E97-73ACFA13230C}" type="datetimeFigureOut">
-              <a:rPr lang="en-US"/>
-              <a:t>7/23/19</a:t>
-            </a:fld>
-            <a:endParaRPr lang="en-US"/>
-          </a:p>
-        </p:txBody>
-      </p:sp>
-      <p:sp>
-        <p:nvSpPr>
-          <p:cNvPr id="4" name="Slide Image Placeholder 3"/>
-          <p:cNvSpPr>
-            <a:spLocks noGrp="1" noRot="1" noChangeAspect="1"/>
-          </p:cNvSpPr>
-          <p:nvPr>
-            <p:ph type="sldImg" idx="2"/>
-          </p:nvPr>
-        </p:nvSpPr>
-        <p:spPr>
-          <a:xfrm>
-            <a:off x="685800" y="1143000"/>
-            <a:ext cx="5486400" cy="3086100"/>
-          </a:xfrm>
-          <a:prstGeom prst="rect">
-            <a:avLst/>
-          </a:prstGeom>
-          <a:noFill/>
-          <a:ln w="12700">
-            <a:solidFill>
-              <a:prstClr val="black"/>
-            </a:solidFill>
-          </a:ln>
-        </p:spPr>
-        <p:txBody>
-          <a:bodyPr vert="horz" lIns="91440" tIns="45720" rIns="91440" bIns="45720" rtlCol="0" anchor="ctr"/>
-          <a:lstStyle/>
-          <a:p>
-            <a:endParaRPr lang="en-US"/>
-          </a:p>
-        </p:txBody>
-      </p:sp>
-      <p:sp>
-        <p:nvSpPr>
-          <p:cNvPr id="5" name="Notes Placeholder 4"/>
-          <p:cNvSpPr>
-            <a:spLocks noGrp="1"/>
-          </p:cNvSpPr>
-          <p:nvPr>
-            <p:ph type="body" sz="quarter" idx="3"/>
-          </p:nvPr>
-        </p:nvSpPr>
-        <p:spPr>
-          <a:xfrm>
-            <a:off x="685800" y="4400550"/>
-            <a:ext cx="5486400" cy="3600450"/>
-          </a:xfrm>
-          <a:prstGeom prst="rect">
-            <a:avLst/>
-          </a:prstGeom>
-        </p:spPr>
-        <p:txBody>
-          <a:bodyPr vert="horz" lIns="91440" tIns="45720" rIns="91440" bIns="45720" rtlCol="0"/>
-          <a:lstStyle/>
-          <a:p>
-            <a:pPr lvl="0"/>
-            <a:r>
-              <a:rPr lang="en-US"/>
-              <a:t>Click to edit Master text styles</a:t>
-            </a:r>
-          </a:p>
-          <a:p>
-            <a:pPr lvl="1"/>
-            <a:r>
-              <a:rPr lang="en-US"/>
-              <a:t>Second level</a:t>
-            </a:r>
-          </a:p>
-          <a:p>
-            <a:pPr lvl="2"/>
-            <a:r>
-              <a:rPr lang="en-US"/>
-              <a:t>Third level</a:t>
-            </a:r>
-          </a:p>
-          <a:p>
-            <a:pPr lvl="3"/>
-            <a:r>
-              <a:rPr lang="en-US"/>
-              <a:t>Fourth level</a:t>
-            </a:r>
-          </a:p>
-          <a:p>
-            <a:pPr lvl="4"/>
-            <a:r>
-              <a:rPr lang="en-US"/>
-              <a:t>Fifth level</a:t>
-            </a:r>
-          </a:p>
-        </p:txBody>
-      </p:sp>
-      <p:sp>
-        <p:nvSpPr>
-          <p:cNvPr id="6" name="Footer Placeholder 5"/>
-          <p:cNvSpPr>
-            <a:spLocks noGrp="1"/>
-          </p:cNvSpPr>
-          <p:nvPr>
-            <p:ph type="ftr" sz="quarter" idx="4"/>
-          </p:nvPr>
-        </p:nvSpPr>
-        <p:spPr>
-          <a:xfrm>
-            <a:off x="0" y="8685213"/>
-            <a:ext cx="2971800" cy="458787"/>
-          </a:xfrm>
-          <a:prstGeom prst="rect">
-            <a:avLst/>
-          </a:prstGeom>
-        </p:spPr>
-        <p:txBody>
-          <a:bodyPr vert="horz" lIns="91440" tIns="45720" rIns="91440" bIns="45720" rtlCol="0" anchor="b"/>
-          <a:lstStyle>
-            <a:lvl1pPr algn="l">
-              <a:defRPr sz="1200"/>
-            </a:lvl1pPr>
-          </a:lstStyle>
-          <a:p>
-            <a:endParaRPr lang="en-US"/>
-          </a:p>
-        </p:txBody>
-      </p:sp>
-      <p:sp>
-        <p:nvSpPr>
-          <p:cNvPr id="7" name="Slide Number Placeholder 6"/>
-          <p:cNvSpPr>
-            <a:spLocks noGrp="1"/>
-          </p:cNvSpPr>
-          <p:nvPr>
-            <p:ph type="sldNum" sz="quarter" idx="5"/>
-          </p:nvPr>
-        </p:nvSpPr>
-        <p:spPr>
-          <a:xfrm>
-            <a:off x="3884613" y="8685213"/>
-            <a:ext cx="2971800" cy="458787"/>
-          </a:xfrm>
-          <a:prstGeom prst="rect">
-            <a:avLst/>
-          </a:prstGeom>
-        </p:spPr>
-        <p:txBody>
-          <a:bodyPr vert="horz" lIns="91440" tIns="45720" rIns="91440" bIns="45720" rtlCol="0" anchor="b"/>
-          <a:lstStyle>
-            <a:lvl1pPr algn="r">
-              <a:defRPr sz="1200"/>
-            </a:lvl1pPr>
-          </a:lstStyle>
-          <a:p>
-            <a:fld id="{CE5E9CC1-C706-0F49-92D6-E571CC5EEA8F}" type="slidenum">
-              <a:rPr lang="en-US"/>
-              <a:t>‹#›</a:t>
-            </a:fld>
-            <a:endParaRPr lang="en-US"/>
-          </a:p>
-        </p:txBody>
-      </p:sp>
     </p:spTree>
     <p:extLst>
       <p:ext uri="{BB962C8B-B14F-4D97-AF65-F5344CB8AC3E}">
-        <p14:creationId xmlns:p14="http://schemas.microsoft.com/office/powerpoint/2010/main" val="1024086991"/>
+        <p14:creationId xmlns:p14="http://schemas.microsoft.com/office/powerpoint/2010/main" val="1934304758"/>
       </p:ext>
     </p:extLst>
   </p:cSld>
@@ -510,10 +291,6 @@
           <a:bodyPr/>
           <a:lstStyle/>
           <a:p>
-            <a:r>
-              <a:rPr lang="en-US" dirty="0"/>
-              <a:t/>
-            </a:r>
             <a:endParaRPr lang="en-US" dirty="0"/>
           </a:p>
         </p:txBody>
@@ -598,10 +375,6 @@
           <a:bodyPr/>
           <a:lstStyle/>
           <a:p>
-            <a:r>
-              <a:rPr lang="en-US" dirty="0"/>
-              <a:t/>
-            </a:r>
             <a:endParaRPr lang="en-US" dirty="0"/>
           </a:p>
         </p:txBody>
@@ -686,10 +459,6 @@
           <a:bodyPr/>
           <a:lstStyle/>
           <a:p>
-            <a:r>
-              <a:rPr lang="en-US" dirty="0"/>
-              <a:t/>
-            </a:r>
             <a:endParaRPr lang="en-US" dirty="0"/>
           </a:p>
         </p:txBody>
@@ -774,10 +543,6 @@
           <a:bodyPr/>
           <a:lstStyle/>
           <a:p>
-            <a:r>
-              <a:rPr lang="en-US" dirty="0"/>
-              <a:t/>
-            </a:r>
             <a:endParaRPr lang="en-US" dirty="0"/>
           </a:p>
         </p:txBody>
@@ -862,10 +627,6 @@
           <a:bodyPr/>
           <a:lstStyle/>
           <a:p>
-            <a:r>
-              <a:rPr lang="en-US" dirty="0"/>
-              <a:t/>
-            </a:r>
             <a:endParaRPr lang="en-US" dirty="0"/>
           </a:p>
         </p:txBody>
@@ -950,10 +711,6 @@
           <a:bodyPr/>
           <a:lstStyle/>
           <a:p>
-            <a:r>
-              <a:rPr lang="en-US" dirty="0"/>
-              <a:t/>
-            </a:r>
             <a:endParaRPr lang="en-US" dirty="0"/>
           </a:p>
         </p:txBody>
@@ -1038,10 +795,6 @@
           <a:bodyPr/>
           <a:lstStyle/>
           <a:p>
-            <a:r>
-              <a:rPr lang="en-US" dirty="0"/>
-              <a:t/>
-            </a:r>
             <a:endParaRPr lang="en-US" dirty="0"/>
           </a:p>
         </p:txBody>
@@ -1126,10 +879,6 @@
           <a:bodyPr/>
           <a:lstStyle/>
           <a:p>
-            <a:r>
-              <a:rPr lang="en-US" dirty="0"/>
-              <a:t/>
-            </a:r>
             <a:endParaRPr lang="en-US" dirty="0"/>
           </a:p>
         </p:txBody>
@@ -1214,10 +963,6 @@
           <a:bodyPr/>
           <a:lstStyle/>
           <a:p>
-            <a:r>
-              <a:rPr lang="en-US" dirty="0"/>
-              <a:t/>
-            </a:r>
             <a:endParaRPr lang="en-US" dirty="0"/>
           </a:p>
         </p:txBody>
@@ -1302,10 +1047,6 @@
           <a:bodyPr/>
           <a:lstStyle/>
           <a:p>
-            <a:r>
-              <a:rPr lang="en-US" dirty="0"/>
-              <a:t/>
-            </a:r>
             <a:endParaRPr lang="en-US" dirty="0"/>
           </a:p>
         </p:txBody>
@@ -1390,10 +1131,6 @@
           <a:bodyPr/>
           <a:lstStyle/>
           <a:p>
-            <a:r>
-              <a:rPr lang="en-US" dirty="0"/>
-              <a:t/>
-            </a:r>
             <a:endParaRPr lang="en-US" dirty="0"/>
           </a:p>
         </p:txBody>
@@ -1467,6 +1204,11 @@
 <file path=ppt/slideMasters/slideMaster1.xml><?xml version="1.0" encoding="utf-8"?>
 <p:sldMaster xmlns:a="http://schemas.openxmlformats.org/drawingml/2006/main" xmlns:r="http://schemas.openxmlformats.org/officeDocument/2006/relationships" xmlns:p="http://schemas.openxmlformats.org/presentationml/2006/main">
   <p:cSld>
+    <p:bg>
+      <p:bgRef idx="1001">
+        <a:schemeClr val="bg1"/>
+      </p:bgRef>
+    </p:bg>
     <p:spTree>
       <p:nvGrpSpPr>
         <p:cNvPr id="1" name=""/>
@@ -1749,6 +1491,7 @@
         <a:solidFill>
           <a:srgbClr val="028090"/>
         </a:solidFill>
+        <a:effectLst/>
       </p:bgPr>
     </p:bg>
     <p:spTree>
@@ -1786,9 +1529,20 @@
           <a:bodyPr wrap="square" rtlCol="0" anchor="ctr"/>
           <a:lstStyle/>
           <a:p>
-            <a:pPr algn="ctr" indent="0" marL="0">
-              <a:buNone/>
-            </a:pPr>
+            <a:pPr marL="0" indent="0" algn="ctr">
+              <a:buNone/>
+            </a:pPr>
+            <a:r>
+              <a:rPr lang="en-US" sz="4800" b="1" dirty="0" err="1">
+                <a:solidFill>
+                  <a:srgbClr val="FFFFFF"/>
+                </a:solidFill>
+                <a:latin typeface="Arial" pitchFamily="34" charset="0"/>
+                <a:ea typeface="Arial" pitchFamily="34" charset="-122"/>
+                <a:cs typeface="Arial" pitchFamily="34" charset="-120"/>
+              </a:rPr>
+              <a:t>Alarma</a:t>
+            </a:r>
             <a:r>
               <a:rPr lang="en-US" sz="4800" b="1" dirty="0">
                 <a:solidFill>
@@ -1798,7 +1552,7 @@
                 <a:ea typeface="Arial" pitchFamily="34" charset="-122"/>
                 <a:cs typeface="Arial" pitchFamily="34" charset="-120"/>
               </a:rPr>
-              <a:t>EmsAlarm</a:t>
+              <a:t>!</a:t>
             </a:r>
             <a:endParaRPr lang="en-US" sz="4800" dirty="0"/>
           </a:p>
@@ -1825,7 +1579,7 @@
           <a:bodyPr wrap="square" rtlCol="0" anchor="ctr"/>
           <a:lstStyle/>
           <a:p>
-            <a:pPr algn="ctr" indent="0" marL="0">
+            <a:pPr marL="0" indent="0" algn="ctr">
               <a:buNone/>
             </a:pPr>
             <a:r>
@@ -1864,7 +1618,7 @@
           <a:bodyPr wrap="square" rtlCol="0" anchor="ctr"/>
           <a:lstStyle/>
           <a:p>
-            <a:pPr algn="ctr" indent="0" marL="0">
+            <a:pPr marL="0" indent="0" algn="ctr">
               <a:buNone/>
             </a:pPr>
             <a:r>
@@ -1903,7 +1657,7 @@
           <a:bodyPr wrap="square" rtlCol="0" anchor="ctr"/>
           <a:lstStyle/>
           <a:p>
-            <a:pPr algn="ctr" indent="0" marL="0">
+            <a:pPr marL="0" indent="0" algn="ctr">
               <a:buNone/>
             </a:pPr>
             <a:r>
@@ -1918,9 +1672,6 @@
               <a:t>Ein Konzept von
 </a:t>
             </a:r>
-            <a:pPr algn="ctr" indent="0" marL="0">
-              <a:buNone/>
-            </a:pPr>
             <a:r>
               <a:rPr lang="en-US" sz="1500" b="1" dirty="0">
                 <a:solidFill>
@@ -1933,9 +1684,6 @@
               <a:t>Alexander Waller und Claude AI
 </a:t>
             </a:r>
-            <a:pPr algn="ctr" indent="0" marL="0">
-              <a:buNone/>
-            </a:pPr>
             <a:r>
               <a:rPr lang="en-US" sz="1200" dirty="0">
                 <a:solidFill>
@@ -1946,10 +1694,11 @@
                 <a:cs typeface="Arial" pitchFamily="34" charset="-120"/>
               </a:rPr>
               <a:t>
-Stadt Hohenems
-</a:t>
-            </a:r>
-            <a:pPr algn="ctr" indent="0" marL="0">
+WebPoint Internet Solutions</a:t>
+            </a:r>
+          </a:p>
+          <a:p>
+            <a:pPr marL="0" indent="0" algn="ctr">
               <a:buNone/>
             </a:pPr>
             <a:r>
@@ -1961,12 +1710,18 @@
                 <a:ea typeface="Arial" pitchFamily="34" charset="-122"/>
                 <a:cs typeface="Arial" pitchFamily="34" charset="-120"/>
               </a:rPr>
-              <a:t>Organisation, Prozessmanagement und IT
-</a:t>
-            </a:r>
-            <a:pPr algn="ctr" indent="0" marL="0">
-              <a:buNone/>
-            </a:pPr>
+              <a:t>Alexander Waller</a:t>
+            </a:r>
+            <a:br>
+              <a:rPr lang="en-US" sz="1000" dirty="0">
+                <a:solidFill>
+                  <a:srgbClr val="F5F5F5"/>
+                </a:solidFill>
+                <a:latin typeface="Arial" pitchFamily="34" charset="0"/>
+                <a:ea typeface="Arial" pitchFamily="34" charset="-122"/>
+                <a:cs typeface="Arial" pitchFamily="34" charset="-120"/>
+              </a:rPr>
+            </a:br>
             <a:r>
               <a:rPr lang="en-US" sz="1000" dirty="0">
                 <a:solidFill>
@@ -1998,6 +1753,7 @@
         <a:solidFill>
           <a:srgbClr val="FFFFFF"/>
         </a:solidFill>
+        <a:effectLst/>
       </p:bgPr>
     </p:bg>
     <p:spTree>
@@ -2035,7 +1791,7 @@
           <a:bodyPr wrap="square" rtlCol="0" anchor="ctr"/>
           <a:lstStyle/>
           <a:p>
-            <a:pPr indent="0" marL="0">
+            <a:pPr marL="0" indent="0">
               <a:buNone/>
             </a:pPr>
             <a:r>
@@ -2094,7 +1850,7 @@
           <a:bodyPr wrap="square" rtlCol="0" anchor="ctr"/>
           <a:lstStyle/>
           <a:p>
-            <a:pPr indent="0" marL="0">
+            <a:pPr marL="0" indent="0">
               <a:buNone/>
             </a:pPr>
             <a:r>
@@ -2133,7 +1889,7 @@
           <a:bodyPr wrap="square" rtlCol="0" anchor="ctr"/>
           <a:lstStyle/>
           <a:p>
-            <a:pPr algn="r" indent="0" marL="0">
+            <a:pPr marL="0" indent="0" algn="r">
               <a:buNone/>
             </a:pPr>
             <a:r>
@@ -2172,7 +1928,7 @@
           <a:bodyPr wrap="square" rtlCol="0" anchor="ctr"/>
           <a:lstStyle/>
           <a:p>
-            <a:pPr indent="0" marL="0">
+            <a:pPr marL="0" indent="0">
               <a:buNone/>
             </a:pPr>
             <a:r>
@@ -2211,7 +1967,7 @@
           <a:bodyPr wrap="square" rtlCol="0" anchor="ctr"/>
           <a:lstStyle/>
           <a:p>
-            <a:pPr indent="0" marL="0">
+            <a:pPr marL="0" indent="0">
               <a:buNone/>
             </a:pPr>
             <a:r>
@@ -2250,7 +2006,7 @@
           <a:bodyPr wrap="square" rtlCol="0" anchor="ctr"/>
           <a:lstStyle/>
           <a:p>
-            <a:pPr indent="0" marL="0">
+            <a:pPr marL="0" indent="0">
               <a:buNone/>
             </a:pPr>
             <a:r>
@@ -2309,7 +2065,7 @@
           <a:bodyPr wrap="square" rtlCol="0" anchor="ctr"/>
           <a:lstStyle/>
           <a:p>
-            <a:pPr indent="0" marL="0">
+            <a:pPr marL="0" indent="0">
               <a:buNone/>
             </a:pPr>
             <a:r>
@@ -2348,7 +2104,7 @@
           <a:bodyPr wrap="square" rtlCol="0" anchor="ctr"/>
           <a:lstStyle/>
           <a:p>
-            <a:pPr algn="r" indent="0" marL="0">
+            <a:pPr marL="0" indent="0" algn="r">
               <a:buNone/>
             </a:pPr>
             <a:r>
@@ -2387,7 +2143,7 @@
           <a:bodyPr wrap="square" rtlCol="0" anchor="ctr"/>
           <a:lstStyle/>
           <a:p>
-            <a:pPr indent="0" marL="0">
+            <a:pPr marL="0" indent="0">
               <a:buNone/>
             </a:pPr>
             <a:r>
@@ -2426,7 +2182,7 @@
           <a:bodyPr wrap="square" rtlCol="0" anchor="ctr"/>
           <a:lstStyle/>
           <a:p>
-            <a:pPr indent="0" marL="0">
+            <a:pPr marL="0" indent="0">
               <a:buNone/>
             </a:pPr>
             <a:r>
@@ -2465,7 +2221,7 @@
           <a:bodyPr wrap="square" rtlCol="0" anchor="ctr"/>
           <a:lstStyle/>
           <a:p>
-            <a:pPr indent="0" marL="0">
+            <a:pPr marL="0" indent="0">
               <a:buNone/>
             </a:pPr>
             <a:r>
@@ -2524,7 +2280,7 @@
           <a:bodyPr wrap="square" rtlCol="0" anchor="ctr"/>
           <a:lstStyle/>
           <a:p>
-            <a:pPr indent="0" marL="0">
+            <a:pPr marL="0" indent="0">
               <a:buNone/>
             </a:pPr>
             <a:r>
@@ -2563,7 +2319,7 @@
           <a:bodyPr wrap="square" rtlCol="0" anchor="ctr"/>
           <a:lstStyle/>
           <a:p>
-            <a:pPr algn="r" indent="0" marL="0">
+            <a:pPr marL="0" indent="0" algn="r">
               <a:buNone/>
             </a:pPr>
             <a:r>
@@ -2602,7 +2358,7 @@
           <a:bodyPr wrap="square" rtlCol="0" anchor="ctr"/>
           <a:lstStyle/>
           <a:p>
-            <a:pPr indent="0" marL="0">
+            <a:pPr marL="0" indent="0">
               <a:buNone/>
             </a:pPr>
             <a:r>
@@ -2641,7 +2397,7 @@
           <a:bodyPr wrap="square" rtlCol="0" anchor="ctr"/>
           <a:lstStyle/>
           <a:p>
-            <a:pPr indent="0" marL="0">
+            <a:pPr marL="0" indent="0">
               <a:buNone/>
             </a:pPr>
             <a:r>
@@ -2680,7 +2436,7 @@
           <a:bodyPr wrap="square" rtlCol="0" anchor="ctr"/>
           <a:lstStyle/>
           <a:p>
-            <a:pPr indent="0" marL="0">
+            <a:pPr marL="0" indent="0">
               <a:buNone/>
             </a:pPr>
             <a:r>
@@ -2719,7 +2475,7 @@
           <a:bodyPr wrap="square" rtlCol="0" anchor="ctr"/>
           <a:lstStyle/>
           <a:p>
-            <a:pPr algn="ctr" indent="0" marL="0">
+            <a:pPr marL="0" indent="0" algn="ctr">
               <a:buNone/>
             </a:pPr>
             <a:r>
@@ -2753,6 +2509,7 @@
         <a:solidFill>
           <a:srgbClr val="028090"/>
         </a:solidFill>
+        <a:effectLst/>
       </p:bgPr>
     </p:bg>
     <p:spTree>
@@ -2790,9 +2547,20 @@
           <a:bodyPr wrap="square" rtlCol="0" anchor="ctr"/>
           <a:lstStyle/>
           <a:p>
-            <a:pPr algn="ctr" indent="0" marL="0">
-              <a:buNone/>
-            </a:pPr>
+            <a:pPr marL="0" indent="0" algn="ctr">
+              <a:buNone/>
+            </a:pPr>
+            <a:r>
+              <a:rPr lang="en-US" sz="3200" b="1" dirty="0" err="1">
+                <a:solidFill>
+                  <a:srgbClr val="FFFFFF"/>
+                </a:solidFill>
+                <a:latin typeface="Arial" pitchFamily="34" charset="0"/>
+                <a:ea typeface="Arial" pitchFamily="34" charset="-122"/>
+                <a:cs typeface="Arial" pitchFamily="34" charset="-120"/>
+              </a:rPr>
+              <a:t>Alarma</a:t>
+            </a:r>
             <a:r>
               <a:rPr lang="en-US" sz="3200" b="1" dirty="0">
                 <a:solidFill>
@@ -2802,7 +2570,7 @@
                 <a:ea typeface="Arial" pitchFamily="34" charset="-122"/>
                 <a:cs typeface="Arial" pitchFamily="34" charset="-120"/>
               </a:rPr>
-              <a:t>EmsAlarm - Zusammenfassung</a:t>
+              <a:t>! - Zusammenfassung</a:t>
             </a:r>
             <a:endParaRPr lang="en-US" sz="3200" dirty="0"/>
           </a:p>
@@ -2829,7 +2597,7 @@
           <a:bodyPr wrap="square" rtlCol="0" anchor="ctr"/>
           <a:lstStyle/>
           <a:p>
-            <a:pPr indent="0" marL="0">
+            <a:pPr marL="0" indent="0">
               <a:buNone/>
             </a:pPr>
             <a:r>
@@ -2868,7 +2636,7 @@
           <a:bodyPr wrap="square" rtlCol="0" anchor="ctr"/>
           <a:lstStyle/>
           <a:p>
-            <a:pPr indent="0" marL="0">
+            <a:pPr marL="0" indent="0">
               <a:buNone/>
             </a:pPr>
             <a:r>
@@ -2907,7 +2675,7 @@
           <a:bodyPr wrap="square" rtlCol="0" anchor="ctr"/>
           <a:lstStyle/>
           <a:p>
-            <a:pPr indent="0" marL="0">
+            <a:pPr marL="0" indent="0">
               <a:buNone/>
             </a:pPr>
             <a:r>
@@ -2946,7 +2714,7 @@
           <a:bodyPr wrap="square" rtlCol="0" anchor="ctr"/>
           <a:lstStyle/>
           <a:p>
-            <a:pPr indent="0" marL="0">
+            <a:pPr marL="0" indent="0">
               <a:buNone/>
             </a:pPr>
             <a:r>
@@ -2985,7 +2753,7 @@
           <a:bodyPr wrap="square" rtlCol="0" anchor="ctr"/>
           <a:lstStyle/>
           <a:p>
-            <a:pPr indent="0" marL="0">
+            <a:pPr marL="0" indent="0">
               <a:buNone/>
             </a:pPr>
             <a:r>
@@ -3044,7 +2812,7 @@
           <a:bodyPr wrap="square" rtlCol="0" anchor="ctr"/>
           <a:lstStyle/>
           <a:p>
-            <a:pPr algn="ctr" indent="0" marL="0">
+            <a:pPr marL="0" indent="0" algn="ctr">
               <a:buNone/>
             </a:pPr>
             <a:r>
@@ -3078,6 +2846,7 @@
         <a:solidFill>
           <a:srgbClr val="FFFFFF"/>
         </a:solidFill>
+        <a:effectLst/>
       </p:bgPr>
     </p:bg>
     <p:spTree>
@@ -3115,7 +2884,7 @@
           <a:bodyPr wrap="square" rtlCol="0" anchor="ctr"/>
           <a:lstStyle/>
           <a:p>
-            <a:pPr indent="0" marL="0">
+            <a:pPr marL="0" indent="0">
               <a:buNone/>
             </a:pPr>
             <a:r>
@@ -3179,7 +2948,7 @@
           <a:bodyPr wrap="square" rtlCol="0" anchor="ctr"/>
           <a:lstStyle/>
           <a:p>
-            <a:pPr algn="ctr" indent="0" marL="0">
+            <a:pPr marL="0" indent="0" algn="ctr">
               <a:buNone/>
             </a:pPr>
             <a:r>
@@ -3215,7 +2984,7 @@
           <a:bodyPr wrap="square" rtlCol="0" anchor="ctr"/>
           <a:lstStyle/>
           <a:p>
-            <a:pPr indent="0" marL="0">
+            <a:pPr marL="0" indent="0">
               <a:buNone/>
             </a:pPr>
             <a:r>
@@ -3254,7 +3023,7 @@
           <a:bodyPr wrap="square" rtlCol="0" anchor="ctr"/>
           <a:lstStyle/>
           <a:p>
-            <a:pPr indent="0" marL="0">
+            <a:pPr marL="0" indent="0">
               <a:buNone/>
             </a:pPr>
             <a:r>
@@ -3318,7 +3087,7 @@
           <a:bodyPr wrap="square" rtlCol="0" anchor="ctr"/>
           <a:lstStyle/>
           <a:p>
-            <a:pPr algn="ctr" indent="0" marL="0">
+            <a:pPr marL="0" indent="0" algn="ctr">
               <a:buNone/>
             </a:pPr>
             <a:r>
@@ -3354,7 +3123,7 @@
           <a:bodyPr wrap="square" rtlCol="0" anchor="ctr"/>
           <a:lstStyle/>
           <a:p>
-            <a:pPr indent="0" marL="0">
+            <a:pPr marL="0" indent="0">
               <a:buNone/>
             </a:pPr>
             <a:r>
@@ -3393,7 +3162,7 @@
           <a:bodyPr wrap="square" rtlCol="0" anchor="ctr"/>
           <a:lstStyle/>
           <a:p>
-            <a:pPr indent="0" marL="0">
+            <a:pPr marL="0" indent="0">
               <a:buNone/>
             </a:pPr>
             <a:r>
@@ -3457,7 +3226,7 @@
           <a:bodyPr wrap="square" rtlCol="0" anchor="ctr"/>
           <a:lstStyle/>
           <a:p>
-            <a:pPr algn="ctr" indent="0" marL="0">
+            <a:pPr marL="0" indent="0" algn="ctr">
               <a:buNone/>
             </a:pPr>
             <a:r>
@@ -3493,7 +3262,7 @@
           <a:bodyPr wrap="square" rtlCol="0" anchor="ctr"/>
           <a:lstStyle/>
           <a:p>
-            <a:pPr indent="0" marL="0">
+            <a:pPr marL="0" indent="0">
               <a:buNone/>
             </a:pPr>
             <a:r>
@@ -3532,7 +3301,7 @@
           <a:bodyPr wrap="square" rtlCol="0" anchor="ctr"/>
           <a:lstStyle/>
           <a:p>
-            <a:pPr indent="0" marL="0">
+            <a:pPr marL="0" indent="0">
               <a:buNone/>
             </a:pPr>
             <a:r>
@@ -3596,7 +3365,7 @@
           <a:bodyPr wrap="square" rtlCol="0" anchor="ctr"/>
           <a:lstStyle/>
           <a:p>
-            <a:pPr algn="ctr" indent="0" marL="0">
+            <a:pPr marL="0" indent="0" algn="ctr">
               <a:buNone/>
             </a:pPr>
             <a:r>
@@ -3632,7 +3401,7 @@
           <a:bodyPr wrap="square" rtlCol="0" anchor="ctr"/>
           <a:lstStyle/>
           <a:p>
-            <a:pPr indent="0" marL="0">
+            <a:pPr marL="0" indent="0">
               <a:buNone/>
             </a:pPr>
             <a:r>
@@ -3671,7 +3440,7 @@
           <a:bodyPr wrap="square" rtlCol="0" anchor="ctr"/>
           <a:lstStyle/>
           <a:p>
-            <a:pPr indent="0" marL="0">
+            <a:pPr marL="0" indent="0">
               <a:buNone/>
             </a:pPr>
             <a:r>
@@ -3705,6 +3474,7 @@
         <a:solidFill>
           <a:srgbClr val="FFFFFF"/>
         </a:solidFill>
+        <a:effectLst/>
       </p:bgPr>
     </p:bg>
     <p:spTree>
@@ -3742,7 +3512,7 @@
           <a:bodyPr wrap="square" rtlCol="0" anchor="ctr"/>
           <a:lstStyle/>
           <a:p>
-            <a:pPr indent="0" marL="0">
+            <a:pPr marL="0" indent="0">
               <a:buNone/>
             </a:pPr>
             <a:r>
@@ -3754,7 +3524,29 @@
                 <a:ea typeface="Arial" pitchFamily="34" charset="-122"/>
                 <a:cs typeface="Arial" pitchFamily="34" charset="-120"/>
               </a:rPr>
-              <a:t>Die Lösung: EmsAlarm</a:t>
+              <a:t>Die Lösung: </a:t>
+            </a:r>
+            <a:r>
+              <a:rPr lang="en-US" sz="3200" b="1" dirty="0" err="1">
+                <a:solidFill>
+                  <a:srgbClr val="028090"/>
+                </a:solidFill>
+                <a:latin typeface="Arial" pitchFamily="34" charset="0"/>
+                <a:ea typeface="Arial" pitchFamily="34" charset="-122"/>
+                <a:cs typeface="Arial" pitchFamily="34" charset="-120"/>
+              </a:rPr>
+              <a:t>Alarma</a:t>
+            </a:r>
+            <a:r>
+              <a:rPr lang="en-US" sz="3200" b="1" dirty="0">
+                <a:solidFill>
+                  <a:srgbClr val="028090"/>
+                </a:solidFill>
+                <a:latin typeface="Arial" pitchFamily="34" charset="0"/>
+                <a:ea typeface="Arial" pitchFamily="34" charset="-122"/>
+                <a:cs typeface="Arial" pitchFamily="34" charset="-120"/>
+              </a:rPr>
+              <a:t>!</a:t>
             </a:r>
             <a:endParaRPr lang="en-US" sz="3200" dirty="0"/>
           </a:p>
@@ -3781,7 +3573,7 @@
           <a:bodyPr wrap="square" rtlCol="0" anchor="ctr"/>
           <a:lstStyle/>
           <a:p>
-            <a:pPr indent="0" marL="0">
+            <a:pPr marL="0" indent="0">
               <a:buNone/>
             </a:pPr>
             <a:r>
@@ -3820,7 +3612,7 @@
           <a:bodyPr wrap="square" rtlCol="0" anchor="ctr"/>
           <a:lstStyle/>
           <a:p>
-            <a:pPr indent="0" marL="0">
+            <a:pPr marL="0" indent="0">
               <a:buNone/>
             </a:pPr>
             <a:r>
@@ -3859,7 +3651,7 @@
           <a:bodyPr wrap="square" rtlCol="0" anchor="ctr"/>
           <a:lstStyle/>
           <a:p>
-            <a:pPr indent="0" marL="0">
+            <a:pPr marL="0" indent="0">
               <a:buNone/>
             </a:pPr>
             <a:r>
@@ -3898,7 +3690,7 @@
           <a:bodyPr wrap="square" rtlCol="0" anchor="ctr"/>
           <a:lstStyle/>
           <a:p>
-            <a:pPr indent="0" marL="0">
+            <a:pPr marL="0" indent="0">
               <a:buNone/>
             </a:pPr>
             <a:r>
@@ -3937,7 +3729,7 @@
           <a:bodyPr wrap="square" rtlCol="0" anchor="ctr"/>
           <a:lstStyle/>
           <a:p>
-            <a:pPr indent="0" marL="0">
+            <a:pPr marL="0" indent="0">
               <a:buNone/>
             </a:pPr>
             <a:r>
@@ -3976,7 +3768,7 @@
           <a:bodyPr wrap="square" rtlCol="0" anchor="ctr"/>
           <a:lstStyle/>
           <a:p>
-            <a:pPr indent="0" marL="0">
+            <a:pPr marL="0" indent="0">
               <a:buNone/>
             </a:pPr>
             <a:r>
@@ -4035,7 +3827,7 @@
           <a:bodyPr wrap="square" rtlCol="0" anchor="ctr"/>
           <a:lstStyle/>
           <a:p>
-            <a:pPr algn="ctr" indent="0" marL="0">
+            <a:pPr marL="0" indent="0" algn="ctr">
               <a:buNone/>
             </a:pPr>
             <a:r>
@@ -4069,6 +3861,7 @@
         <a:solidFill>
           <a:srgbClr val="FFFFFF"/>
         </a:solidFill>
+        <a:effectLst/>
       </p:bgPr>
     </p:bg>
     <p:spTree>
@@ -4106,7 +3899,7 @@
           <a:bodyPr wrap="square" rtlCol="0" anchor="ctr"/>
           <a:lstStyle/>
           <a:p>
-            <a:pPr indent="0" marL="0">
+            <a:pPr marL="0" indent="0">
               <a:buNone/>
             </a:pPr>
             <a:r>
@@ -4145,7 +3938,7 @@
           <a:bodyPr wrap="square" rtlCol="0" anchor="ctr"/>
           <a:lstStyle/>
           <a:p>
-            <a:pPr algn="ctr" indent="0" marL="0">
+            <a:pPr marL="0" indent="0" algn="ctr">
               <a:buNone/>
             </a:pPr>
             <a:r>
@@ -4162,7 +3955,7 @@
             <a:endParaRPr lang="en-US" sz="1400" dirty="0"/>
           </a:p>
           <a:p>
-            <a:pPr algn="ctr" indent="0" marL="0">
+            <a:pPr marL="0" indent="0" algn="ctr">
               <a:buNone/>
             </a:pPr>
             <a:r>
@@ -4201,7 +3994,7 @@
           <a:bodyPr wrap="square" rtlCol="0" anchor="ctr"/>
           <a:lstStyle/>
           <a:p>
-            <a:pPr algn="ctr" indent="0" marL="0">
+            <a:pPr marL="0" indent="0" algn="ctr">
               <a:buNone/>
             </a:pPr>
             <a:r>
@@ -4260,7 +4053,7 @@
           <a:bodyPr wrap="square" rtlCol="0" anchor="ctr"/>
           <a:lstStyle/>
           <a:p>
-            <a:pPr algn="ctr" indent="0" marL="0">
+            <a:pPr marL="0" indent="0" algn="ctr">
               <a:buNone/>
             </a:pPr>
             <a:r>
@@ -4277,7 +4070,7 @@
             <a:endParaRPr lang="en-US" sz="1500" dirty="0"/>
           </a:p>
           <a:p>
-            <a:pPr algn="ctr" indent="0" marL="0">
+            <a:pPr marL="0" indent="0" algn="ctr">
               <a:buNone/>
             </a:pPr>
             <a:r>
@@ -4316,7 +4109,7 @@
           <a:bodyPr wrap="square" rtlCol="0" anchor="ctr"/>
           <a:lstStyle/>
           <a:p>
-            <a:pPr algn="ctr" indent="0" marL="0">
+            <a:pPr marL="0" indent="0" algn="ctr">
               <a:buNone/>
             </a:pPr>
             <a:r>
@@ -4355,7 +4148,7 @@
           <a:bodyPr wrap="square" rtlCol="0" anchor="ctr"/>
           <a:lstStyle/>
           <a:p>
-            <a:pPr algn="ctr" indent="0" marL="0">
+            <a:pPr marL="0" indent="0" algn="ctr">
               <a:buNone/>
             </a:pPr>
             <a:r>
@@ -4419,7 +4212,7 @@
           <a:bodyPr wrap="square" rtlCol="0" anchor="ctr"/>
           <a:lstStyle/>
           <a:p>
-            <a:pPr algn="ctr" indent="0" marL="0">
+            <a:pPr marL="0" indent="0" algn="ctr">
               <a:buNone/>
             </a:pPr>
             <a:r>
@@ -4436,7 +4229,7 @@
             <a:endParaRPr lang="en-US" sz="1200" dirty="0"/>
           </a:p>
           <a:p>
-            <a:pPr algn="ctr" indent="0" marL="0">
+            <a:pPr marL="0" indent="0" algn="ctr">
               <a:buNone/>
             </a:pPr>
             <a:r>
@@ -4470,6 +4263,7 @@
         <a:solidFill>
           <a:srgbClr val="FFFFFF"/>
         </a:solidFill>
+        <a:effectLst/>
       </p:bgPr>
     </p:bg>
     <p:spTree>
@@ -4507,7 +4301,7 @@
           <a:bodyPr wrap="square" rtlCol="0" anchor="ctr"/>
           <a:lstStyle/>
           <a:p>
-            <a:pPr indent="0" marL="0">
+            <a:pPr marL="0" indent="0">
               <a:buNone/>
             </a:pPr>
             <a:r>
@@ -4566,7 +4360,7 @@
           <a:bodyPr wrap="square" rtlCol="0" anchor="ctr"/>
           <a:lstStyle/>
           <a:p>
-            <a:pPr algn="ctr" indent="0" marL="0">
+            <a:pPr marL="0" indent="0" algn="ctr">
               <a:buNone/>
             </a:pPr>
             <a:r>
@@ -4600,16 +4394,34 @@
         </p:nvGraphicFramePr>
         <p:xfrm>
           <a:off x="914400" y="1828800"/>
-          <a:ext cx="7315200" cy="914400"/>
+          <a:ext cx="7315200" cy="1569720"/>
         </p:xfrm>
         <a:graphic>
           <a:graphicData uri="http://schemas.openxmlformats.org/drawingml/2006/table">
             <a:tbl>
               <a:tblPr/>
               <a:tblGrid>
-                <a:gridCol w="2286000"/>
-                <a:gridCol w="2514600"/>
-                <a:gridCol w="2514600"/>
+                <a:gridCol w="2286000">
+                  <a:extLst>
+                    <a:ext uri="{9D8B030D-6E8A-4147-A177-3AD203B41FA5}">
+                      <a16:colId xmlns:a16="http://schemas.microsoft.com/office/drawing/2014/main" val="20000"/>
+                    </a:ext>
+                  </a:extLst>
+                </a:gridCol>
+                <a:gridCol w="2514600">
+                  <a:extLst>
+                    <a:ext uri="{9D8B030D-6E8A-4147-A177-3AD203B41FA5}">
+                      <a16:colId xmlns:a16="http://schemas.microsoft.com/office/drawing/2014/main" val="20001"/>
+                    </a:ext>
+                  </a:extLst>
+                </a:gridCol>
+                <a:gridCol w="2514600">
+                  <a:extLst>
+                    <a:ext uri="{9D8B030D-6E8A-4147-A177-3AD203B41FA5}">
+                      <a16:colId xmlns:a16="http://schemas.microsoft.com/office/drawing/2014/main" val="20002"/>
+                    </a:ext>
+                  </a:extLst>
+                </a:gridCol>
               </a:tblGrid>
               <a:tr h="0">
                 <a:tc>
@@ -4617,7 +4429,7 @@
                     <a:bodyPr/>
                     <a:lstStyle/>
                     <a:p>
-                      <a:pPr algn="ctr" indent="0" marL="0">
+                      <a:pPr marL="0" indent="0" algn="ctr">
                         <a:buNone/>
                       </a:pPr>
                       <a:r>
@@ -4638,7 +4450,7 @@
                       </a:endParaRPr>
                     </a:p>
                   </a:txBody>
-                  <a:tcPr marL="91440" marR="91440" marT="45720" marB="45720" anchor="ctr">
+                  <a:tcPr anchor="ctr">
                     <a:lnL w="12700" cap="flat" cmpd="sng" algn="ctr">
                       <a:solidFill>
                         <a:srgbClr val="00A896"/>
@@ -4685,7 +4497,7 @@
                     <a:bodyPr/>
                     <a:lstStyle/>
                     <a:p>
-                      <a:pPr algn="ctr" indent="0" marL="0">
+                      <a:pPr marL="0" indent="0" algn="ctr">
                         <a:buNone/>
                       </a:pPr>
                       <a:r>
@@ -4706,7 +4518,7 @@
                       </a:endParaRPr>
                     </a:p>
                   </a:txBody>
-                  <a:tcPr marL="91440" marR="91440" marT="45720" marB="45720" anchor="ctr">
+                  <a:tcPr anchor="ctr">
                     <a:lnL w="12700" cap="flat" cmpd="sng" algn="ctr">
                       <a:solidFill>
                         <a:srgbClr val="00A896"/>
@@ -4753,7 +4565,7 @@
                     <a:bodyPr/>
                     <a:lstStyle/>
                     <a:p>
-                      <a:pPr algn="ctr" indent="0" marL="0">
+                      <a:pPr marL="0" indent="0" algn="ctr">
                         <a:buNone/>
                       </a:pPr>
                       <a:r>
@@ -4774,7 +4586,7 @@
                       </a:endParaRPr>
                     </a:p>
                   </a:txBody>
-                  <a:tcPr marL="91440" marR="91440" marT="45720" marB="45720" anchor="ctr">
+                  <a:tcPr anchor="ctr">
                     <a:lnL w="12700" cap="flat" cmpd="sng" algn="ctr">
                       <a:solidFill>
                         <a:srgbClr val="00A896"/>
@@ -4816,6 +4628,11 @@
                     </a:solidFill>
                   </a:tcPr>
                 </a:tc>
+                <a:extLst>
+                  <a:ext uri="{0D108BD9-81ED-4DB2-BD59-A6C34878D82A}">
+                    <a16:rowId xmlns:a16="http://schemas.microsoft.com/office/drawing/2014/main" val="10000"/>
+                  </a:ext>
+                </a:extLst>
               </a:tr>
               <a:tr h="0">
                 <a:tc>
@@ -4823,7 +4640,7 @@
                     <a:bodyPr/>
                     <a:lstStyle/>
                     <a:p>
-                      <a:pPr algn="ctr" indent="0" marL="0">
+                      <a:pPr marL="0" indent="0" algn="ctr">
                         <a:buNone/>
                       </a:pPr>
                       <a:r>
@@ -4844,7 +4661,7 @@
                       </a:endParaRPr>
                     </a:p>
                   </a:txBody>
-                  <a:tcPr marL="91440" marR="91440" marT="45720" marB="45720" anchor="ctr">
+                  <a:tcPr anchor="ctr">
                     <a:lnL w="12700" cap="flat" cmpd="sng" algn="ctr">
                       <a:solidFill>
                         <a:srgbClr val="00A896"/>
@@ -4891,7 +4708,7 @@
                     <a:bodyPr/>
                     <a:lstStyle/>
                     <a:p>
-                      <a:pPr algn="ctr" indent="0" marL="0">
+                      <a:pPr marL="0" indent="0" algn="ctr">
                         <a:buNone/>
                       </a:pPr>
                       <a:r>
@@ -4912,7 +4729,7 @@
                       </a:endParaRPr>
                     </a:p>
                   </a:txBody>
-                  <a:tcPr marL="91440" marR="91440" marT="45720" marB="45720" anchor="ctr">
+                  <a:tcPr anchor="ctr">
                     <a:lnL w="12700" cap="flat" cmpd="sng" algn="ctr">
                       <a:solidFill>
                         <a:srgbClr val="00A896"/>
@@ -4959,7 +4776,7 @@
                     <a:bodyPr/>
                     <a:lstStyle/>
                     <a:p>
-                      <a:pPr algn="ctr" indent="0" marL="0">
+                      <a:pPr marL="0" indent="0" algn="ctr">
                         <a:buNone/>
                       </a:pPr>
                       <a:r>
@@ -4980,7 +4797,7 @@
                       </a:endParaRPr>
                     </a:p>
                   </a:txBody>
-                  <a:tcPr marL="91440" marR="91440" marT="45720" marB="45720" anchor="ctr">
+                  <a:tcPr anchor="ctr">
                     <a:lnL w="12700" cap="flat" cmpd="sng" algn="ctr">
                       <a:solidFill>
                         <a:srgbClr val="00A896"/>
@@ -5022,6 +4839,11 @@
                     </a:solidFill>
                   </a:tcPr>
                 </a:tc>
+                <a:extLst>
+                  <a:ext uri="{0D108BD9-81ED-4DB2-BD59-A6C34878D82A}">
+                    <a16:rowId xmlns:a16="http://schemas.microsoft.com/office/drawing/2014/main" val="10001"/>
+                  </a:ext>
+                </a:extLst>
               </a:tr>
               <a:tr h="0">
                 <a:tc>
@@ -5029,7 +4851,7 @@
                     <a:bodyPr/>
                     <a:lstStyle/>
                     <a:p>
-                      <a:pPr algn="ctr" indent="0" marL="0">
+                      <a:pPr marL="0" indent="0" algn="ctr">
                         <a:buNone/>
                       </a:pPr>
                       <a:r>
@@ -5050,7 +4872,7 @@
                       </a:endParaRPr>
                     </a:p>
                   </a:txBody>
-                  <a:tcPr marL="91440" marR="91440" marT="45720" marB="45720" anchor="ctr">
+                  <a:tcPr anchor="ctr">
                     <a:lnL w="12700" cap="flat" cmpd="sng" algn="ctr">
                       <a:solidFill>
                         <a:srgbClr val="00A896"/>
@@ -5097,7 +4919,7 @@
                     <a:bodyPr/>
                     <a:lstStyle/>
                     <a:p>
-                      <a:pPr algn="ctr" indent="0" marL="0">
+                      <a:pPr marL="0" indent="0" algn="ctr">
                         <a:buNone/>
                       </a:pPr>
                       <a:r>
@@ -5118,7 +4940,7 @@
                       </a:endParaRPr>
                     </a:p>
                   </a:txBody>
-                  <a:tcPr marL="91440" marR="91440" marT="45720" marB="45720" anchor="ctr">
+                  <a:tcPr anchor="ctr">
                     <a:lnL w="12700" cap="flat" cmpd="sng" algn="ctr">
                       <a:solidFill>
                         <a:srgbClr val="00A896"/>
@@ -5165,7 +4987,7 @@
                     <a:bodyPr/>
                     <a:lstStyle/>
                     <a:p>
-                      <a:pPr algn="ctr" indent="0" marL="0">
+                      <a:pPr marL="0" indent="0" algn="ctr">
                         <a:buNone/>
                       </a:pPr>
                       <a:r>
@@ -5186,7 +5008,7 @@
                       </a:endParaRPr>
                     </a:p>
                   </a:txBody>
-                  <a:tcPr marL="91440" marR="91440" marT="45720" marB="45720" anchor="ctr">
+                  <a:tcPr anchor="ctr">
                     <a:lnL w="12700" cap="flat" cmpd="sng" algn="ctr">
                       <a:solidFill>
                         <a:srgbClr val="00A896"/>
@@ -5228,6 +5050,11 @@
                     </a:solidFill>
                   </a:tcPr>
                 </a:tc>
+                <a:extLst>
+                  <a:ext uri="{0D108BD9-81ED-4DB2-BD59-A6C34878D82A}">
+                    <a16:rowId xmlns:a16="http://schemas.microsoft.com/office/drawing/2014/main" val="10002"/>
+                  </a:ext>
+                </a:extLst>
               </a:tr>
               <a:tr h="0">
                 <a:tc>
@@ -5235,7 +5062,7 @@
                     <a:bodyPr/>
                     <a:lstStyle/>
                     <a:p>
-                      <a:pPr algn="ctr" indent="0" marL="0">
+                      <a:pPr marL="0" indent="0" algn="ctr">
                         <a:buNone/>
                       </a:pPr>
                       <a:r>
@@ -5256,7 +5083,7 @@
                       </a:endParaRPr>
                     </a:p>
                   </a:txBody>
-                  <a:tcPr marL="91440" marR="91440" marT="45720" marB="45720" anchor="ctr">
+                  <a:tcPr anchor="ctr">
                     <a:lnL w="12700" cap="flat" cmpd="sng" algn="ctr">
                       <a:solidFill>
                         <a:srgbClr val="00A896"/>
@@ -5303,7 +5130,7 @@
                     <a:bodyPr/>
                     <a:lstStyle/>
                     <a:p>
-                      <a:pPr algn="ctr" indent="0" marL="0">
+                      <a:pPr marL="0" indent="0" algn="ctr">
                         <a:buNone/>
                       </a:pPr>
                       <a:r>
@@ -5324,7 +5151,7 @@
                       </a:endParaRPr>
                     </a:p>
                   </a:txBody>
-                  <a:tcPr marL="91440" marR="91440" marT="45720" marB="45720" anchor="ctr">
+                  <a:tcPr anchor="ctr">
                     <a:lnL w="12700" cap="flat" cmpd="sng" algn="ctr">
                       <a:solidFill>
                         <a:srgbClr val="00A896"/>
@@ -5371,7 +5198,7 @@
                     <a:bodyPr/>
                     <a:lstStyle/>
                     <a:p>
-                      <a:pPr algn="ctr" indent="0" marL="0">
+                      <a:pPr marL="0" indent="0" algn="ctr">
                         <a:buNone/>
                       </a:pPr>
                       <a:r>
@@ -5392,7 +5219,7 @@
                       </a:endParaRPr>
                     </a:p>
                   </a:txBody>
-                  <a:tcPr marL="91440" marR="91440" marT="45720" marB="45720" anchor="ctr">
+                  <a:tcPr anchor="ctr">
                     <a:lnL w="12700" cap="flat" cmpd="sng" algn="ctr">
                       <a:solidFill>
                         <a:srgbClr val="00A896"/>
@@ -5434,6 +5261,11 @@
                     </a:solidFill>
                   </a:tcPr>
                 </a:tc>
+                <a:extLst>
+                  <a:ext uri="{0D108BD9-81ED-4DB2-BD59-A6C34878D82A}">
+                    <a16:rowId xmlns:a16="http://schemas.microsoft.com/office/drawing/2014/main" val="10003"/>
+                  </a:ext>
+                </a:extLst>
               </a:tr>
               <a:tr h="0">
                 <a:tc>
@@ -5441,7 +5273,7 @@
                     <a:bodyPr/>
                     <a:lstStyle/>
                     <a:p>
-                      <a:pPr algn="ctr" indent="0" marL="0">
+                      <a:pPr marL="0" indent="0" algn="ctr">
                         <a:buNone/>
                       </a:pPr>
                       <a:r>
@@ -5462,7 +5294,7 @@
                       </a:endParaRPr>
                     </a:p>
                   </a:txBody>
-                  <a:tcPr marL="91440" marR="91440" marT="45720" marB="45720" anchor="ctr">
+                  <a:tcPr anchor="ctr">
                     <a:lnL w="12700" cap="flat" cmpd="sng" algn="ctr">
                       <a:solidFill>
                         <a:srgbClr val="00A896"/>
@@ -5509,7 +5341,7 @@
                     <a:bodyPr/>
                     <a:lstStyle/>
                     <a:p>
-                      <a:pPr algn="ctr" indent="0" marL="0">
+                      <a:pPr marL="0" indent="0" algn="ctr">
                         <a:buNone/>
                       </a:pPr>
                       <a:r>
@@ -5530,7 +5362,7 @@
                       </a:endParaRPr>
                     </a:p>
                   </a:txBody>
-                  <a:tcPr marL="91440" marR="91440" marT="45720" marB="45720" anchor="ctr">
+                  <a:tcPr anchor="ctr">
                     <a:lnL w="12700" cap="flat" cmpd="sng" algn="ctr">
                       <a:solidFill>
                         <a:srgbClr val="00A896"/>
@@ -5577,7 +5409,7 @@
                     <a:bodyPr/>
                     <a:lstStyle/>
                     <a:p>
-                      <a:pPr algn="ctr" indent="0" marL="0">
+                      <a:pPr marL="0" indent="0" algn="ctr">
                         <a:buNone/>
                       </a:pPr>
                       <a:r>
@@ -5598,7 +5430,7 @@
                       </a:endParaRPr>
                     </a:p>
                   </a:txBody>
-                  <a:tcPr marL="91440" marR="91440" marT="45720" marB="45720" anchor="ctr">
+                  <a:tcPr anchor="ctr">
                     <a:lnL w="12700" cap="flat" cmpd="sng" algn="ctr">
                       <a:solidFill>
                         <a:srgbClr val="00A896"/>
@@ -5640,6 +5472,11 @@
                     </a:solidFill>
                   </a:tcPr>
                 </a:tc>
+                <a:extLst>
+                  <a:ext uri="{0D108BD9-81ED-4DB2-BD59-A6C34878D82A}">
+                    <a16:rowId xmlns:a16="http://schemas.microsoft.com/office/drawing/2014/main" val="10004"/>
+                  </a:ext>
+                </a:extLst>
               </a:tr>
               <a:tr h="0">
                 <a:tc>
@@ -5647,7 +5484,7 @@
                     <a:bodyPr/>
                     <a:lstStyle/>
                     <a:p>
-                      <a:pPr algn="ctr" indent="0" marL="0">
+                      <a:pPr marL="0" indent="0" algn="ctr">
                         <a:buNone/>
                       </a:pPr>
                       <a:r>
@@ -5668,7 +5505,7 @@
                       </a:endParaRPr>
                     </a:p>
                   </a:txBody>
-                  <a:tcPr marL="91440" marR="91440" marT="45720" marB="45720" anchor="ctr">
+                  <a:tcPr anchor="ctr">
                     <a:lnL w="12700" cap="flat" cmpd="sng" algn="ctr">
                       <a:solidFill>
                         <a:srgbClr val="00A896"/>
@@ -5715,7 +5552,7 @@
                     <a:bodyPr/>
                     <a:lstStyle/>
                     <a:p>
-                      <a:pPr algn="ctr" indent="0" marL="0">
+                      <a:pPr marL="0" indent="0" algn="ctr">
                         <a:buNone/>
                       </a:pPr>
                       <a:r>
@@ -5736,7 +5573,7 @@
                       </a:endParaRPr>
                     </a:p>
                   </a:txBody>
-                  <a:tcPr marL="91440" marR="91440" marT="45720" marB="45720" anchor="ctr">
+                  <a:tcPr anchor="ctr">
                     <a:lnL w="12700" cap="flat" cmpd="sng" algn="ctr">
                       <a:solidFill>
                         <a:srgbClr val="00A896"/>
@@ -5783,7 +5620,7 @@
                     <a:bodyPr/>
                     <a:lstStyle/>
                     <a:p>
-                      <a:pPr algn="ctr" indent="0" marL="0">
+                      <a:pPr marL="0" indent="0" algn="ctr">
                         <a:buNone/>
                       </a:pPr>
                       <a:r>
@@ -5804,7 +5641,7 @@
                       </a:endParaRPr>
                     </a:p>
                   </a:txBody>
-                  <a:tcPr marL="91440" marR="91440" marT="45720" marB="45720" anchor="ctr">
+                  <a:tcPr anchor="ctr">
                     <a:lnL w="12700" cap="flat" cmpd="sng" algn="ctr">
                       <a:solidFill>
                         <a:srgbClr val="00A896"/>
@@ -5846,6 +5683,11 @@
                     </a:solidFill>
                   </a:tcPr>
                 </a:tc>
+                <a:extLst>
+                  <a:ext uri="{0D108BD9-81ED-4DB2-BD59-A6C34878D82A}">
+                    <a16:rowId xmlns:a16="http://schemas.microsoft.com/office/drawing/2014/main" val="10005"/>
+                  </a:ext>
+                </a:extLst>
               </a:tr>
             </a:tbl>
           </a:graphicData>
@@ -5853,7 +5695,7 @@
       </p:graphicFrame>
       <p:sp>
         <p:nvSpPr>
-          <p:cNvPr id="6" name="Text 3"/>
+          <p:cNvPr id="5" name="Text 3"/>
           <p:cNvSpPr/>
           <p:nvPr/>
         </p:nvSpPr>
@@ -5872,7 +5714,7 @@
           <a:bodyPr wrap="square" rtlCol="0" anchor="ctr"/>
           <a:lstStyle/>
           <a:p>
-            <a:pPr indent="0" marL="0">
+            <a:pPr marL="0" indent="0">
               <a:buNone/>
             </a:pPr>
             <a:r>
@@ -5911,7 +5753,7 @@
           <a:bodyPr wrap="square" rtlCol="0" anchor="ctr"/>
           <a:lstStyle/>
           <a:p>
-            <a:pPr indent="0" marL="0">
+            <a:pPr marL="0" indent="0">
               <a:buNone/>
             </a:pPr>
             <a:r>
@@ -5950,7 +5792,7 @@
           <a:bodyPr wrap="square" rtlCol="0" anchor="ctr"/>
           <a:lstStyle/>
           <a:p>
-            <a:pPr indent="0" marL="0">
+            <a:pPr marL="0" indent="0">
               <a:buNone/>
             </a:pPr>
             <a:r>
@@ -5989,7 +5831,7 @@
           <a:bodyPr wrap="square" rtlCol="0" anchor="ctr"/>
           <a:lstStyle/>
           <a:p>
-            <a:pPr indent="0" marL="0">
+            <a:pPr marL="0" indent="0">
               <a:buNone/>
             </a:pPr>
             <a:r>
@@ -6023,6 +5865,7 @@
         <a:solidFill>
           <a:srgbClr val="FFFFFF"/>
         </a:solidFill>
+        <a:effectLst/>
       </p:bgPr>
     </p:bg>
     <p:spTree>
@@ -6060,7 +5903,7 @@
           <a:bodyPr wrap="square" rtlCol="0" anchor="ctr"/>
           <a:lstStyle/>
           <a:p>
-            <a:pPr indent="0" marL="0">
+            <a:pPr marL="0" indent="0">
               <a:buNone/>
             </a:pPr>
             <a:r>
@@ -6124,7 +5967,7 @@
           <a:bodyPr wrap="square" rtlCol="0" anchor="ctr"/>
           <a:lstStyle/>
           <a:p>
-            <a:pPr indent="0" marL="0">
+            <a:pPr marL="0" indent="0">
               <a:buNone/>
             </a:pPr>
             <a:r>
@@ -6163,7 +6006,7 @@
           <a:bodyPr wrap="square" rtlCol="0" anchor="ctr"/>
           <a:lstStyle/>
           <a:p>
-            <a:pPr indent="0" marL="0">
+            <a:pPr marL="0" indent="0">
               <a:buNone/>
             </a:pPr>
             <a:r>
@@ -6222,7 +6065,7 @@
           <a:bodyPr wrap="square" rtlCol="0" anchor="ctr"/>
           <a:lstStyle/>
           <a:p>
-            <a:pPr algn="ctr" indent="0" marL="0">
+            <a:pPr marL="0" indent="0" algn="ctr">
               <a:buNone/>
             </a:pPr>
             <a:r>
@@ -6286,7 +6129,7 @@
           <a:bodyPr wrap="square" rtlCol="0" anchor="ctr"/>
           <a:lstStyle/>
           <a:p>
-            <a:pPr indent="0" marL="0">
+            <a:pPr marL="0" indent="0">
               <a:buNone/>
             </a:pPr>
             <a:r>
@@ -6325,7 +6168,7 @@
           <a:bodyPr wrap="square" rtlCol="0" anchor="ctr"/>
           <a:lstStyle/>
           <a:p>
-            <a:pPr indent="0" marL="0">
+            <a:pPr marL="0" indent="0">
               <a:buNone/>
             </a:pPr>
             <a:r>
@@ -6384,7 +6227,7 @@
           <a:bodyPr wrap="square" rtlCol="0" anchor="ctr"/>
           <a:lstStyle/>
           <a:p>
-            <a:pPr algn="ctr" indent="0" marL="0">
+            <a:pPr marL="0" indent="0" algn="ctr">
               <a:buNone/>
             </a:pPr>
             <a:r>
@@ -6448,7 +6291,7 @@
           <a:bodyPr wrap="square" rtlCol="0" anchor="ctr"/>
           <a:lstStyle/>
           <a:p>
-            <a:pPr indent="0" marL="0">
+            <a:pPr marL="0" indent="0">
               <a:buNone/>
             </a:pPr>
             <a:r>
@@ -6487,7 +6330,7 @@
           <a:bodyPr wrap="square" rtlCol="0" anchor="ctr"/>
           <a:lstStyle/>
           <a:p>
-            <a:pPr indent="0" marL="0">
+            <a:pPr marL="0" indent="0">
               <a:buNone/>
             </a:pPr>
             <a:r>
@@ -6546,7 +6389,7 @@
           <a:bodyPr wrap="square" rtlCol="0" anchor="ctr"/>
           <a:lstStyle/>
           <a:p>
-            <a:pPr algn="ctr" indent="0" marL="0">
+            <a:pPr marL="0" indent="0" algn="ctr">
               <a:buNone/>
             </a:pPr>
             <a:r>
@@ -6610,7 +6453,7 @@
           <a:bodyPr wrap="square" rtlCol="0" anchor="ctr"/>
           <a:lstStyle/>
           <a:p>
-            <a:pPr indent="0" marL="0">
+            <a:pPr marL="0" indent="0">
               <a:buNone/>
             </a:pPr>
             <a:r>
@@ -6649,7 +6492,7 @@
           <a:bodyPr wrap="square" rtlCol="0" anchor="ctr"/>
           <a:lstStyle/>
           <a:p>
-            <a:pPr indent="0" marL="0">
+            <a:pPr marL="0" indent="0">
               <a:buNone/>
             </a:pPr>
             <a:r>
@@ -6708,7 +6551,7 @@
           <a:bodyPr wrap="square" rtlCol="0" anchor="ctr"/>
           <a:lstStyle/>
           <a:p>
-            <a:pPr algn="ctr" indent="0" marL="0">
+            <a:pPr marL="0" indent="0" algn="ctr">
               <a:buNone/>
             </a:pPr>
             <a:r>
@@ -6772,7 +6615,7 @@
           <a:bodyPr wrap="square" rtlCol="0" anchor="ctr"/>
           <a:lstStyle/>
           <a:p>
-            <a:pPr indent="0" marL="0">
+            <a:pPr marL="0" indent="0">
               <a:buNone/>
             </a:pPr>
             <a:r>
@@ -6811,7 +6654,7 @@
           <a:bodyPr wrap="square" rtlCol="0" anchor="ctr"/>
           <a:lstStyle/>
           <a:p>
-            <a:pPr indent="0" marL="0">
+            <a:pPr marL="0" indent="0">
               <a:buNone/>
             </a:pPr>
             <a:r>
@@ -6870,7 +6713,7 @@
           <a:bodyPr wrap="square" rtlCol="0" anchor="ctr"/>
           <a:lstStyle/>
           <a:p>
-            <a:pPr algn="ctr" indent="0" marL="0">
+            <a:pPr marL="0" indent="0" algn="ctr">
               <a:buNone/>
             </a:pPr>
             <a:r>
@@ -6909,7 +6752,7 @@
           <a:bodyPr wrap="square" rtlCol="0" anchor="ctr"/>
           <a:lstStyle/>
           <a:p>
-            <a:pPr algn="ctr" indent="0" marL="0">
+            <a:pPr marL="0" indent="0" algn="ctr">
               <a:buNone/>
             </a:pPr>
             <a:r>
@@ -6943,6 +6786,7 @@
         <a:solidFill>
           <a:srgbClr val="FFFFFF"/>
         </a:solidFill>
+        <a:effectLst/>
       </p:bgPr>
     </p:bg>
     <p:spTree>
@@ -6980,7 +6824,7 @@
           <a:bodyPr wrap="square" rtlCol="0" anchor="ctr"/>
           <a:lstStyle/>
           <a:p>
-            <a:pPr indent="0" marL="0">
+            <a:pPr marL="0" indent="0">
               <a:buNone/>
             </a:pPr>
             <a:r>
@@ -7019,7 +6863,7 @@
           <a:bodyPr wrap="square" rtlCol="0" anchor="ctr"/>
           <a:lstStyle/>
           <a:p>
-            <a:pPr indent="0" marL="0">
+            <a:pPr marL="0" indent="0">
               <a:buNone/>
             </a:pPr>
             <a:r>
@@ -7078,7 +6922,7 @@
           <a:bodyPr wrap="square" rtlCol="0" anchor="ctr"/>
           <a:lstStyle/>
           <a:p>
-            <a:pPr indent="0" marL="0">
+            <a:pPr marL="0" indent="0">
               <a:buNone/>
             </a:pPr>
             <a:r>
@@ -7095,7 +6939,7 @@
             <a:endParaRPr lang="en-US" sz="1300" dirty="0"/>
           </a:p>
           <a:p>
-            <a:pPr indent="0" marL="0">
+            <a:pPr marL="0" indent="0">
               <a:buNone/>
             </a:pPr>
             <a:r>
@@ -7112,7 +6956,7 @@
             <a:endParaRPr lang="en-US" sz="1300" dirty="0"/>
           </a:p>
           <a:p>
-            <a:pPr indent="0" marL="0">
+            <a:pPr marL="0" indent="0">
               <a:buNone/>
             </a:pPr>
             <a:r>
@@ -7129,7 +6973,7 @@
             <a:endParaRPr lang="en-US" sz="1300" dirty="0"/>
           </a:p>
           <a:p>
-            <a:pPr indent="0" marL="0">
+            <a:pPr marL="0" indent="0">
               <a:buNone/>
             </a:pPr>
             <a:r>
@@ -7168,7 +7012,7 @@
           <a:bodyPr wrap="square" rtlCol="0" anchor="ctr"/>
           <a:lstStyle/>
           <a:p>
-            <a:pPr indent="0" marL="0">
+            <a:pPr marL="0" indent="0">
               <a:buNone/>
             </a:pPr>
             <a:r>
@@ -7207,7 +7051,7 @@
           <a:bodyPr wrap="square" rtlCol="0" anchor="ctr"/>
           <a:lstStyle/>
           <a:p>
-            <a:pPr indent="0" marL="0">
+            <a:pPr marL="0" indent="0">
               <a:buNone/>
             </a:pPr>
             <a:r>
@@ -7246,7 +7090,7 @@
           <a:bodyPr wrap="square" rtlCol="0" anchor="ctr"/>
           <a:lstStyle/>
           <a:p>
-            <a:pPr indent="0" marL="0">
+            <a:pPr marL="0" indent="0">
               <a:buNone/>
             </a:pPr>
             <a:r>
@@ -7285,7 +7129,7 @@
           <a:bodyPr wrap="square" rtlCol="0" anchor="ctr"/>
           <a:lstStyle/>
           <a:p>
-            <a:pPr indent="0" marL="0">
+            <a:pPr marL="0" indent="0">
               <a:buNone/>
             </a:pPr>
             <a:r>
@@ -7324,7 +7168,7 @@
           <a:bodyPr wrap="square" rtlCol="0" anchor="ctr"/>
           <a:lstStyle/>
           <a:p>
-            <a:pPr indent="0" marL="0">
+            <a:pPr marL="0" indent="0">
               <a:buNone/>
             </a:pPr>
             <a:r>
@@ -7363,7 +7207,7 @@
           <a:bodyPr wrap="square" rtlCol="0" anchor="ctr"/>
           <a:lstStyle/>
           <a:p>
-            <a:pPr indent="0" marL="0">
+            <a:pPr marL="0" indent="0">
               <a:buNone/>
             </a:pPr>
             <a:r>
@@ -7427,7 +7271,7 @@
           <a:bodyPr wrap="square" rtlCol="0" anchor="ctr"/>
           <a:lstStyle/>
           <a:p>
-            <a:pPr indent="0" marL="0">
+            <a:pPr marL="0" indent="0">
               <a:buNone/>
             </a:pPr>
             <a:r>
@@ -7461,6 +7305,7 @@
         <a:solidFill>
           <a:srgbClr val="FFFFFF"/>
         </a:solidFill>
+        <a:effectLst/>
       </p:bgPr>
     </p:bg>
     <p:spTree>
@@ -7498,7 +7343,7 @@
           <a:bodyPr wrap="square" rtlCol="0" anchor="ctr"/>
           <a:lstStyle/>
           <a:p>
-            <a:pPr indent="0" marL="0">
+            <a:pPr marL="0" indent="0">
               <a:buNone/>
             </a:pPr>
             <a:r>
@@ -7557,7 +7402,7 @@
           <a:bodyPr wrap="square" rtlCol="0" anchor="ctr"/>
           <a:lstStyle/>
           <a:p>
-            <a:pPr algn="ctr" indent="0" marL="0">
+            <a:pPr marL="0" indent="0" algn="ctr">
               <a:buNone/>
             </a:pPr>
             <a:r>
@@ -7596,7 +7441,7 @@
           <a:bodyPr wrap="square" rtlCol="0" anchor="ctr"/>
           <a:lstStyle/>
           <a:p>
-            <a:pPr indent="0" marL="0">
+            <a:pPr marL="0" indent="0">
               <a:buNone/>
             </a:pPr>
             <a:r>
@@ -7655,7 +7500,7 @@
           <a:bodyPr wrap="square" rtlCol="0" anchor="ctr"/>
           <a:lstStyle/>
           <a:p>
-            <a:pPr algn="ctr" indent="0" marL="0">
+            <a:pPr marL="0" indent="0" algn="ctr">
               <a:buNone/>
             </a:pPr>
             <a:r>
@@ -7694,7 +7539,7 @@
           <a:bodyPr wrap="square" rtlCol="0" anchor="ctr"/>
           <a:lstStyle/>
           <a:p>
-            <a:pPr indent="0" marL="0">
+            <a:pPr marL="0" indent="0">
               <a:buNone/>
             </a:pPr>
             <a:r>
@@ -7753,7 +7598,7 @@
           <a:bodyPr wrap="square" rtlCol="0" anchor="ctr"/>
           <a:lstStyle/>
           <a:p>
-            <a:pPr algn="ctr" indent="0" marL="0">
+            <a:pPr marL="0" indent="0" algn="ctr">
               <a:buNone/>
             </a:pPr>
             <a:r>
@@ -7792,7 +7637,7 @@
           <a:bodyPr wrap="square" rtlCol="0" anchor="ctr"/>
           <a:lstStyle/>
           <a:p>
-            <a:pPr indent="0" marL="0">
+            <a:pPr marL="0" indent="0">
               <a:buNone/>
             </a:pPr>
             <a:r>
@@ -7851,7 +7696,7 @@
           <a:bodyPr wrap="square" rtlCol="0" anchor="ctr"/>
           <a:lstStyle/>
           <a:p>
-            <a:pPr indent="0" marL="0">
+            <a:pPr marL="0" indent="0">
               <a:buNone/>
             </a:pPr>
             <a:r>
@@ -7890,7 +7735,7 @@
           <a:bodyPr wrap="square" rtlCol="0" anchor="ctr"/>
           <a:lstStyle/>
           <a:p>
-            <a:pPr indent="0" marL="0">
+            <a:pPr marL="0" indent="0">
               <a:buNone/>
             </a:pPr>
             <a:r>
@@ -7924,6 +7769,7 @@
         <a:solidFill>
           <a:srgbClr val="FFFFFF"/>
         </a:solidFill>
+        <a:effectLst/>
       </p:bgPr>
     </p:bg>
     <p:spTree>
@@ -7961,7 +7807,7 @@
           <a:bodyPr wrap="square" rtlCol="0" anchor="ctr"/>
           <a:lstStyle/>
           <a:p>
-            <a:pPr indent="0" marL="0">
+            <a:pPr marL="0" indent="0">
               <a:buNone/>
             </a:pPr>
             <a:r>
@@ -7988,23 +7834,41 @@
           <p:nvPr>
             <p:extLst>
               <p:ext uri="{D42A27DB-BD31-4B8C-83A1-F6EECF244321}">
-                <p14:modId xmlns:p14="http://schemas.microsoft.com/office/powerpoint/2010/main" val="1579011935"/>
+                <p14:modId xmlns:p14="http://schemas.microsoft.com/office/powerpoint/2010/main" val="2111218636"/>
               </p:ext>
             </p:extLst>
           </p:nvPr>
         </p:nvGraphicFramePr>
         <p:xfrm>
           <a:off x="1097280" y="1097280"/>
-          <a:ext cx="6949440" cy="914400"/>
+          <a:ext cx="6949440" cy="1447800"/>
         </p:xfrm>
         <a:graphic>
           <a:graphicData uri="http://schemas.openxmlformats.org/drawingml/2006/table">
             <a:tbl>
               <a:tblPr/>
               <a:tblGrid>
-                <a:gridCol w="1645920"/>
-                <a:gridCol w="2651760"/>
-                <a:gridCol w="2651760"/>
+                <a:gridCol w="1645920">
+                  <a:extLst>
+                    <a:ext uri="{9D8B030D-6E8A-4147-A177-3AD203B41FA5}">
+                      <a16:colId xmlns:a16="http://schemas.microsoft.com/office/drawing/2014/main" val="20000"/>
+                    </a:ext>
+                  </a:extLst>
+                </a:gridCol>
+                <a:gridCol w="2651760">
+                  <a:extLst>
+                    <a:ext uri="{9D8B030D-6E8A-4147-A177-3AD203B41FA5}">
+                      <a16:colId xmlns:a16="http://schemas.microsoft.com/office/drawing/2014/main" val="20001"/>
+                    </a:ext>
+                  </a:extLst>
+                </a:gridCol>
+                <a:gridCol w="2651760">
+                  <a:extLst>
+                    <a:ext uri="{9D8B030D-6E8A-4147-A177-3AD203B41FA5}">
+                      <a16:colId xmlns:a16="http://schemas.microsoft.com/office/drawing/2014/main" val="20002"/>
+                    </a:ext>
+                  </a:extLst>
+                </a:gridCol>
               </a:tblGrid>
               <a:tr h="0">
                 <a:tc>
@@ -8012,7 +7876,7 @@
                     <a:bodyPr/>
                     <a:lstStyle/>
                     <a:p>
-                      <a:pPr algn="ctr" indent="0" marL="0">
+                      <a:pPr marL="0" indent="0" algn="ctr">
                         <a:buNone/>
                       </a:pPr>
                       <a:endParaRPr lang="en-US" sz="1300" dirty="0">
@@ -8022,7 +7886,7 @@
                       </a:endParaRPr>
                     </a:p>
                   </a:txBody>
-                  <a:tcPr marL="91440" marR="91440" marT="45720" marB="45720" anchor="ctr">
+                  <a:tcPr anchor="ctr">
                     <a:lnL w="12700" cap="flat" cmpd="sng" algn="ctr">
                       <a:solidFill>
                         <a:srgbClr val="00A896"/>
@@ -8069,9 +7933,20 @@
                     <a:bodyPr/>
                     <a:lstStyle/>
                     <a:p>
-                      <a:pPr algn="ctr" indent="0" marL="0">
+                      <a:pPr marL="0" indent="0" algn="ctr">
                         <a:buNone/>
                       </a:pPr>
+                      <a:r>
+                        <a:rPr lang="en-US" sz="1300" b="1" dirty="0" err="1">
+                          <a:solidFill>
+                            <a:srgbClr val="FFFFFF"/>
+                          </a:solidFill>
+                          <a:latin typeface="Arial" pitchFamily="34" charset="0"/>
+                          <a:ea typeface="Arial" pitchFamily="34" charset="-122"/>
+                          <a:cs typeface="Arial" pitchFamily="34" charset="-120"/>
+                        </a:rPr>
+                        <a:t>Alarma</a:t>
+                      </a:r>
                       <a:r>
                         <a:rPr lang="en-US" sz="1300" b="1" dirty="0">
                           <a:solidFill>
@@ -8081,7 +7956,7 @@
                           <a:ea typeface="Arial" pitchFamily="34" charset="-122"/>
                           <a:cs typeface="Arial" pitchFamily="34" charset="-120"/>
                         </a:rPr>
-                        <a:t>EmsAlarm</a:t>
+                        <a:t>!</a:t>
                       </a:r>
                       <a:endParaRPr lang="en-US" sz="1300" dirty="0">
                         <a:latin typeface="Arial" charset="0"/>
@@ -8090,7 +7965,7 @@
                       </a:endParaRPr>
                     </a:p>
                   </a:txBody>
-                  <a:tcPr marL="91440" marR="91440" marT="45720" marB="45720" anchor="ctr">
+                  <a:tcPr anchor="ctr">
                     <a:lnL w="12700" cap="flat" cmpd="sng" algn="ctr">
                       <a:solidFill>
                         <a:srgbClr val="00A896"/>
@@ -8137,7 +8012,7 @@
                     <a:bodyPr/>
                     <a:lstStyle/>
                     <a:p>
-                      <a:pPr algn="ctr" indent="0" marL="0">
+                      <a:pPr marL="0" indent="0" algn="ctr">
                         <a:buNone/>
                       </a:pPr>
                       <a:r>
@@ -8158,7 +8033,7 @@
                       </a:endParaRPr>
                     </a:p>
                   </a:txBody>
-                  <a:tcPr marL="91440" marR="91440" marT="45720" marB="45720" anchor="ctr">
+                  <a:tcPr anchor="ctr">
                     <a:lnL w="12700" cap="flat" cmpd="sng" algn="ctr">
                       <a:solidFill>
                         <a:srgbClr val="00A896"/>
@@ -8200,6 +8075,11 @@
                     </a:solidFill>
                   </a:tcPr>
                 </a:tc>
+                <a:extLst>
+                  <a:ext uri="{0D108BD9-81ED-4DB2-BD59-A6C34878D82A}">
+                    <a16:rowId xmlns:a16="http://schemas.microsoft.com/office/drawing/2014/main" val="10000"/>
+                  </a:ext>
+                </a:extLst>
               </a:tr>
               <a:tr h="0">
                 <a:tc>
@@ -8207,7 +8087,7 @@
                     <a:bodyPr/>
                     <a:lstStyle/>
                     <a:p>
-                      <a:pPr algn="ctr" indent="0" marL="0">
+                      <a:pPr marL="0" indent="0" algn="ctr">
                         <a:buNone/>
                       </a:pPr>
                       <a:r>
@@ -8228,7 +8108,7 @@
                       </a:endParaRPr>
                     </a:p>
                   </a:txBody>
-                  <a:tcPr marL="91440" marR="91440" marT="45720" marB="45720" anchor="ctr">
+                  <a:tcPr anchor="ctr">
                     <a:lnL w="12700" cap="flat" cmpd="sng" algn="ctr">
                       <a:solidFill>
                         <a:srgbClr val="00A896"/>
@@ -8275,7 +8155,7 @@
                     <a:bodyPr/>
                     <a:lstStyle/>
                     <a:p>
-                      <a:pPr algn="ctr" indent="0" marL="0">
+                      <a:pPr marL="0" indent="0" algn="ctr">
                         <a:buNone/>
                       </a:pPr>
                       <a:r>
@@ -8296,7 +8176,7 @@
                       </a:endParaRPr>
                     </a:p>
                   </a:txBody>
-                  <a:tcPr marL="91440" marR="91440" marT="45720" marB="45720" anchor="ctr">
+                  <a:tcPr anchor="ctr">
                     <a:lnL w="12700" cap="flat" cmpd="sng" algn="ctr">
                       <a:solidFill>
                         <a:srgbClr val="00A896"/>
@@ -8343,7 +8223,7 @@
                     <a:bodyPr/>
                     <a:lstStyle/>
                     <a:p>
-                      <a:pPr algn="ctr" indent="0" marL="0">
+                      <a:pPr marL="0" indent="0" algn="ctr">
                         <a:buNone/>
                       </a:pPr>
                       <a:r>
@@ -8364,7 +8244,7 @@
                       </a:endParaRPr>
                     </a:p>
                   </a:txBody>
-                  <a:tcPr marL="91440" marR="91440" marT="45720" marB="45720" anchor="ctr">
+                  <a:tcPr anchor="ctr">
                     <a:lnL w="12700" cap="flat" cmpd="sng" algn="ctr">
                       <a:solidFill>
                         <a:srgbClr val="00A896"/>
@@ -8406,6 +8286,11 @@
                     </a:solidFill>
                   </a:tcPr>
                 </a:tc>
+                <a:extLst>
+                  <a:ext uri="{0D108BD9-81ED-4DB2-BD59-A6C34878D82A}">
+                    <a16:rowId xmlns:a16="http://schemas.microsoft.com/office/drawing/2014/main" val="10001"/>
+                  </a:ext>
+                </a:extLst>
               </a:tr>
               <a:tr h="0">
                 <a:tc>
@@ -8413,7 +8298,7 @@
                     <a:bodyPr/>
                     <a:lstStyle/>
                     <a:p>
-                      <a:pPr algn="ctr" indent="0" marL="0">
+                      <a:pPr marL="0" indent="0" algn="ctr">
                         <a:buNone/>
                       </a:pPr>
                       <a:r>
@@ -8434,7 +8319,7 @@
                       </a:endParaRPr>
                     </a:p>
                   </a:txBody>
-                  <a:tcPr marL="91440" marR="91440" marT="45720" marB="45720" anchor="ctr">
+                  <a:tcPr anchor="ctr">
                     <a:lnL w="12700" cap="flat" cmpd="sng" algn="ctr">
                       <a:solidFill>
                         <a:srgbClr val="00A896"/>
@@ -8481,7 +8366,7 @@
                     <a:bodyPr/>
                     <a:lstStyle/>
                     <a:p>
-                      <a:pPr algn="ctr" indent="0" marL="0">
+                      <a:pPr marL="0" indent="0" algn="ctr">
                         <a:buNone/>
                       </a:pPr>
                       <a:r>
@@ -8502,7 +8387,7 @@
                       </a:endParaRPr>
                     </a:p>
                   </a:txBody>
-                  <a:tcPr marL="91440" marR="91440" marT="45720" marB="45720" anchor="ctr">
+                  <a:tcPr anchor="ctr">
                     <a:lnL w="12700" cap="flat" cmpd="sng" algn="ctr">
                       <a:solidFill>
                         <a:srgbClr val="00A896"/>
@@ -8549,7 +8434,7 @@
                     <a:bodyPr/>
                     <a:lstStyle/>
                     <a:p>
-                      <a:pPr algn="ctr" indent="0" marL="0">
+                      <a:pPr marL="0" indent="0" algn="ctr">
                         <a:buNone/>
                       </a:pPr>
                       <a:r>
@@ -8570,7 +8455,7 @@
                       </a:endParaRPr>
                     </a:p>
                   </a:txBody>
-                  <a:tcPr marL="91440" marR="91440" marT="45720" marB="45720" anchor="ctr">
+                  <a:tcPr anchor="ctr">
                     <a:lnL w="12700" cap="flat" cmpd="sng" algn="ctr">
                       <a:solidFill>
                         <a:srgbClr val="00A896"/>
@@ -8612,6 +8497,11 @@
                     </a:solidFill>
                   </a:tcPr>
                 </a:tc>
+                <a:extLst>
+                  <a:ext uri="{0D108BD9-81ED-4DB2-BD59-A6C34878D82A}">
+                    <a16:rowId xmlns:a16="http://schemas.microsoft.com/office/drawing/2014/main" val="10002"/>
+                  </a:ext>
+                </a:extLst>
               </a:tr>
               <a:tr h="0">
                 <a:tc>
@@ -8619,7 +8509,7 @@
                     <a:bodyPr/>
                     <a:lstStyle/>
                     <a:p>
-                      <a:pPr algn="ctr" indent="0" marL="0">
+                      <a:pPr marL="0" indent="0" algn="ctr">
                         <a:buNone/>
                       </a:pPr>
                       <a:r>
@@ -8640,7 +8530,7 @@
                       </a:endParaRPr>
                     </a:p>
                   </a:txBody>
-                  <a:tcPr marL="91440" marR="91440" marT="45720" marB="45720" anchor="ctr">
+                  <a:tcPr anchor="ctr">
                     <a:lnL w="12700" cap="flat" cmpd="sng" algn="ctr">
                       <a:solidFill>
                         <a:srgbClr val="00A896"/>
@@ -8687,7 +8577,7 @@
                     <a:bodyPr/>
                     <a:lstStyle/>
                     <a:p>
-                      <a:pPr algn="ctr" indent="0" marL="0">
+                      <a:pPr marL="0" indent="0" algn="ctr">
                         <a:buNone/>
                       </a:pPr>
                       <a:r>
@@ -8708,7 +8598,7 @@
                       </a:endParaRPr>
                     </a:p>
                   </a:txBody>
-                  <a:tcPr marL="91440" marR="91440" marT="45720" marB="45720" anchor="ctr">
+                  <a:tcPr anchor="ctr">
                     <a:lnL w="12700" cap="flat" cmpd="sng" algn="ctr">
                       <a:solidFill>
                         <a:srgbClr val="00A896"/>
@@ -8755,7 +8645,7 @@
                     <a:bodyPr/>
                     <a:lstStyle/>
                     <a:p>
-                      <a:pPr algn="ctr" indent="0" marL="0">
+                      <a:pPr marL="0" indent="0" algn="ctr">
                         <a:buNone/>
                       </a:pPr>
                       <a:r>
@@ -8776,7 +8666,7 @@
                       </a:endParaRPr>
                     </a:p>
                   </a:txBody>
-                  <a:tcPr marL="91440" marR="91440" marT="45720" marB="45720" anchor="ctr">
+                  <a:tcPr anchor="ctr">
                     <a:lnL w="12700" cap="flat" cmpd="sng" algn="ctr">
                       <a:solidFill>
                         <a:srgbClr val="00A896"/>
@@ -8818,6 +8708,11 @@
                     </a:solidFill>
                   </a:tcPr>
                 </a:tc>
+                <a:extLst>
+                  <a:ext uri="{0D108BD9-81ED-4DB2-BD59-A6C34878D82A}">
+                    <a16:rowId xmlns:a16="http://schemas.microsoft.com/office/drawing/2014/main" val="10003"/>
+                  </a:ext>
+                </a:extLst>
               </a:tr>
               <a:tr h="0">
                 <a:tc>
@@ -8825,7 +8720,7 @@
                     <a:bodyPr/>
                     <a:lstStyle/>
                     <a:p>
-                      <a:pPr algn="ctr" indent="0" marL="0">
+                      <a:pPr marL="0" indent="0" algn="ctr">
                         <a:buNone/>
                       </a:pPr>
                       <a:r>
@@ -8846,7 +8741,7 @@
                       </a:endParaRPr>
                     </a:p>
                   </a:txBody>
-                  <a:tcPr marL="91440" marR="91440" marT="45720" marB="45720" anchor="ctr">
+                  <a:tcPr anchor="ctr">
                     <a:lnL w="12700" cap="flat" cmpd="sng" algn="ctr">
                       <a:solidFill>
                         <a:srgbClr val="00A896"/>
@@ -8893,7 +8788,7 @@
                     <a:bodyPr/>
                     <a:lstStyle/>
                     <a:p>
-                      <a:pPr algn="ctr" indent="0" marL="0">
+                      <a:pPr marL="0" indent="0" algn="ctr">
                         <a:buNone/>
                       </a:pPr>
                       <a:r>
@@ -8914,7 +8809,7 @@
                       </a:endParaRPr>
                     </a:p>
                   </a:txBody>
-                  <a:tcPr marL="91440" marR="91440" marT="45720" marB="45720" anchor="ctr">
+                  <a:tcPr anchor="ctr">
                     <a:lnL w="12700" cap="flat" cmpd="sng" algn="ctr">
                       <a:solidFill>
                         <a:srgbClr val="00A896"/>
@@ -8961,7 +8856,7 @@
                     <a:bodyPr/>
                     <a:lstStyle/>
                     <a:p>
-                      <a:pPr algn="ctr" indent="0" marL="0">
+                      <a:pPr marL="0" indent="0" algn="ctr">
                         <a:buNone/>
                       </a:pPr>
                       <a:r>
@@ -8982,7 +8877,7 @@
                       </a:endParaRPr>
                     </a:p>
                   </a:txBody>
-                  <a:tcPr marL="91440" marR="91440" marT="45720" marB="45720" anchor="ctr">
+                  <a:tcPr anchor="ctr">
                     <a:lnL w="12700" cap="flat" cmpd="sng" algn="ctr">
                       <a:solidFill>
                         <a:srgbClr val="00A896"/>
@@ -9024,6 +8919,11 @@
                     </a:solidFill>
                   </a:tcPr>
                 </a:tc>
+                <a:extLst>
+                  <a:ext uri="{0D108BD9-81ED-4DB2-BD59-A6C34878D82A}">
+                    <a16:rowId xmlns:a16="http://schemas.microsoft.com/office/drawing/2014/main" val="10004"/>
+                  </a:ext>
+                </a:extLst>
               </a:tr>
             </a:tbl>
           </a:graphicData>
@@ -9070,7 +8970,7 @@
           <a:bodyPr wrap="square" rtlCol="0" anchor="ctr"/>
           <a:lstStyle/>
           <a:p>
-            <a:pPr algn="ctr" indent="0" marL="0">
+            <a:pPr marL="0" indent="0" algn="ctr">
               <a:buNone/>
             </a:pPr>
             <a:r>
@@ -9087,7 +8987,7 @@
             <a:endParaRPr lang="en-US" sz="1200" dirty="0"/>
           </a:p>
           <a:p>
-            <a:pPr algn="ctr" indent="0" marL="0">
+            <a:pPr marL="0" indent="0" algn="ctr">
               <a:buNone/>
             </a:pPr>
             <a:r>
@@ -9126,7 +9026,7 @@
           <a:bodyPr wrap="square" rtlCol="0" anchor="ctr"/>
           <a:lstStyle/>
           <a:p>
-            <a:pPr algn="ctr" indent="0" marL="0">
+            <a:pPr marL="0" indent="0" algn="ctr">
               <a:buNone/>
             </a:pPr>
             <a:r>
@@ -9185,7 +9085,7 @@
           <a:bodyPr wrap="square" rtlCol="0" anchor="ctr"/>
           <a:lstStyle/>
           <a:p>
-            <a:pPr algn="ctr" indent="0" marL="0">
+            <a:pPr marL="0" indent="0" algn="ctr">
               <a:buNone/>
             </a:pPr>
             <a:r>
@@ -9224,7 +9124,7 @@
           <a:bodyPr wrap="square" rtlCol="0" anchor="ctr"/>
           <a:lstStyle/>
           <a:p>
-            <a:pPr algn="ctr" indent="0" marL="0">
+            <a:pPr marL="0" indent="0" algn="ctr">
               <a:buNone/>
             </a:pPr>
             <a:r>
@@ -9543,4 +9443,319 @@
     </a:ext>
   </a:extLst>
 </a:theme>
+</file>
+
+<file path=ppt/theme/theme2.xml><?xml version="1.0" encoding="utf-8"?>
+<a:theme xmlns:a="http://schemas.openxmlformats.org/drawingml/2006/main" name="Office">
+  <a:themeElements>
+    <a:clrScheme name="Office">
+      <a:dk1>
+        <a:sysClr val="windowText" lastClr="000000"/>
+      </a:dk1>
+      <a:lt1>
+        <a:sysClr val="window" lastClr="FFFFFF"/>
+      </a:lt1>
+      <a:dk2>
+        <a:srgbClr val="0E2841"/>
+      </a:dk2>
+      <a:lt2>
+        <a:srgbClr val="E8E8E8"/>
+      </a:lt2>
+      <a:accent1>
+        <a:srgbClr val="156082"/>
+      </a:accent1>
+      <a:accent2>
+        <a:srgbClr val="E97132"/>
+      </a:accent2>
+      <a:accent3>
+        <a:srgbClr val="196B24"/>
+      </a:accent3>
+      <a:accent4>
+        <a:srgbClr val="0F9ED5"/>
+      </a:accent4>
+      <a:accent5>
+        <a:srgbClr val="A02B93"/>
+      </a:accent5>
+      <a:accent6>
+        <a:srgbClr val="4EA72E"/>
+      </a:accent6>
+      <a:hlink>
+        <a:srgbClr val="467886"/>
+      </a:hlink>
+      <a:folHlink>
+        <a:srgbClr val="96607D"/>
+      </a:folHlink>
+    </a:clrScheme>
+    <a:fontScheme name="Office">
+      <a:majorFont>
+        <a:latin typeface="Aptos Display" panose="02110004020202020204"/>
+        <a:ea typeface=""/>
+        <a:cs typeface=""/>
+        <a:font script="Jpan" typeface="游ゴシック Light"/>
+        <a:font script="Hang" typeface="맑은 고딕"/>
+        <a:font script="Hans" typeface="等线 Light"/>
+        <a:font script="Hant" typeface="新細明體"/>
+        <a:font script="Arab" typeface="Times New Roman"/>
+        <a:font script="Hebr" typeface="Times New Roman"/>
+        <a:font script="Thai" typeface="Angsana New"/>
+        <a:font script="Ethi" typeface="Nyala"/>
+        <a:font script="Beng" typeface="Vrinda"/>
+        <a:font script="Gujr" typeface="Shruti"/>
+        <a:font script="Khmr" typeface="MoolBoran"/>
+        <a:font script="Knda" typeface="Tunga"/>
+        <a:font script="Guru" typeface="Raavi"/>
+        <a:font script="Cans" typeface="Euphemia"/>
+        <a:font script="Cher" typeface="Plantagenet Cherokee"/>
+        <a:font script="Yiii" typeface="Microsoft Yi Baiti"/>
+        <a:font script="Tibt" typeface="Microsoft Himalaya"/>
+        <a:font script="Thaa" typeface="MV Boli"/>
+        <a:font script="Deva" typeface="Mangal"/>
+        <a:font script="Telu" typeface="Gautami"/>
+        <a:font script="Taml" typeface="Latha"/>
+        <a:font script="Syrc" typeface="Estrangelo Edessa"/>
+        <a:font script="Orya" typeface="Kalinga"/>
+        <a:font script="Mlym" typeface="Kartika"/>
+        <a:font script="Laoo" typeface="DokChampa"/>
+        <a:font script="Sinh" typeface="Iskoola Pota"/>
+        <a:font script="Mong" typeface="Mongolian Baiti"/>
+        <a:font script="Viet" typeface="Times New Roman"/>
+        <a:font script="Uigh" typeface="Microsoft Uighur"/>
+        <a:font script="Geor" typeface="Sylfaen"/>
+        <a:font script="Armn" typeface="Arial"/>
+        <a:font script="Bugi" typeface="Leelawadee UI"/>
+        <a:font script="Bopo" typeface="Microsoft JhengHei"/>
+        <a:font script="Java" typeface="Javanese Text"/>
+        <a:font script="Lisu" typeface="Segoe UI"/>
+        <a:font script="Mymr" typeface="Myanmar Text"/>
+        <a:font script="Nkoo" typeface="Ebrima"/>
+        <a:font script="Olck" typeface="Nirmala UI"/>
+        <a:font script="Osma" typeface="Ebrima"/>
+        <a:font script="Phag" typeface="Phagspa"/>
+        <a:font script="Syrn" typeface="Estrangelo Edessa"/>
+        <a:font script="Syrj" typeface="Estrangelo Edessa"/>
+        <a:font script="Syre" typeface="Estrangelo Edessa"/>
+        <a:font script="Sora" typeface="Nirmala UI"/>
+        <a:font script="Tale" typeface="Microsoft Tai Le"/>
+        <a:font script="Talu" typeface="Microsoft New Tai Lue"/>
+        <a:font script="Tfng" typeface="Ebrima"/>
+      </a:majorFont>
+      <a:minorFont>
+        <a:latin typeface="Aptos" panose="02110004020202020204"/>
+        <a:ea typeface=""/>
+        <a:cs typeface=""/>
+        <a:font script="Jpan" typeface="游ゴシック"/>
+        <a:font script="Hang" typeface="맑은 고딕"/>
+        <a:font script="Hans" typeface="等线"/>
+        <a:font script="Hant" typeface="新細明體"/>
+        <a:font script="Arab" typeface="Arial"/>
+        <a:font script="Hebr" typeface="Arial"/>
+        <a:font script="Thai" typeface="Cordia New"/>
+        <a:font script="Ethi" typeface="Nyala"/>
+        <a:font script="Beng" typeface="Vrinda"/>
+        <a:font script="Gujr" typeface="Shruti"/>
+        <a:font script="Khmr" typeface="DaunPenh"/>
+        <a:font script="Knda" typeface="Tunga"/>
+        <a:font script="Guru" typeface="Raavi"/>
+        <a:font script="Cans" typeface="Euphemia"/>
+        <a:font script="Cher" typeface="Plantagenet Cherokee"/>
+        <a:font script="Yiii" typeface="Microsoft Yi Baiti"/>
+        <a:font script="Tibt" typeface="Microsoft Himalaya"/>
+        <a:font script="Thaa" typeface="MV Boli"/>
+        <a:font script="Deva" typeface="Mangal"/>
+        <a:font script="Telu" typeface="Gautami"/>
+        <a:font script="Taml" typeface="Latha"/>
+        <a:font script="Syrc" typeface="Estrangelo Edessa"/>
+        <a:font script="Orya" typeface="Kalinga"/>
+        <a:font script="Mlym" typeface="Kartika"/>
+        <a:font script="Laoo" typeface="DokChampa"/>
+        <a:font script="Sinh" typeface="Iskoola Pota"/>
+        <a:font script="Mong" typeface="Mongolian Baiti"/>
+        <a:font script="Viet" typeface="Arial"/>
+        <a:font script="Uigh" typeface="Microsoft Uighur"/>
+        <a:font script="Geor" typeface="Sylfaen"/>
+        <a:font script="Armn" typeface="Arial"/>
+        <a:font script="Bugi" typeface="Leelawadee UI"/>
+        <a:font script="Bopo" typeface="Microsoft JhengHei"/>
+        <a:font script="Java" typeface="Javanese Text"/>
+        <a:font script="Lisu" typeface="Segoe UI"/>
+        <a:font script="Mymr" typeface="Myanmar Text"/>
+        <a:font script="Nkoo" typeface="Ebrima"/>
+        <a:font script="Olck" typeface="Nirmala UI"/>
+        <a:font script="Osma" typeface="Ebrima"/>
+        <a:font script="Phag" typeface="Phagspa"/>
+        <a:font script="Syrn" typeface="Estrangelo Edessa"/>
+        <a:font script="Syrj" typeface="Estrangelo Edessa"/>
+        <a:font script="Syre" typeface="Estrangelo Edessa"/>
+        <a:font script="Sora" typeface="Nirmala UI"/>
+        <a:font script="Tale" typeface="Microsoft Tai Le"/>
+        <a:font script="Talu" typeface="Microsoft New Tai Lue"/>
+        <a:font script="Tfng" typeface="Ebrima"/>
+      </a:minorFont>
+    </a:fontScheme>
+    <a:fmtScheme name="Office">
+      <a:fillStyleLst>
+        <a:solidFill>
+          <a:schemeClr val="phClr"/>
+        </a:solidFill>
+        <a:gradFill rotWithShape="1">
+          <a:gsLst>
+            <a:gs pos="0">
+              <a:schemeClr val="phClr">
+                <a:lumMod val="110000"/>
+                <a:satMod val="105000"/>
+                <a:tint val="67000"/>
+              </a:schemeClr>
+            </a:gs>
+            <a:gs pos="50000">
+              <a:schemeClr val="phClr">
+                <a:lumMod val="105000"/>
+                <a:satMod val="103000"/>
+                <a:tint val="73000"/>
+              </a:schemeClr>
+            </a:gs>
+            <a:gs pos="100000">
+              <a:schemeClr val="phClr">
+                <a:lumMod val="105000"/>
+                <a:satMod val="109000"/>
+                <a:tint val="81000"/>
+              </a:schemeClr>
+            </a:gs>
+          </a:gsLst>
+          <a:lin ang="5400000" scaled="0"/>
+        </a:gradFill>
+        <a:gradFill rotWithShape="1">
+          <a:gsLst>
+            <a:gs pos="0">
+              <a:schemeClr val="phClr">
+                <a:satMod val="103000"/>
+                <a:lumMod val="102000"/>
+                <a:tint val="94000"/>
+              </a:schemeClr>
+            </a:gs>
+            <a:gs pos="50000">
+              <a:schemeClr val="phClr">
+                <a:satMod val="110000"/>
+                <a:lumMod val="100000"/>
+                <a:shade val="100000"/>
+              </a:schemeClr>
+            </a:gs>
+            <a:gs pos="100000">
+              <a:schemeClr val="phClr">
+                <a:lumMod val="99000"/>
+                <a:satMod val="120000"/>
+                <a:shade val="78000"/>
+              </a:schemeClr>
+            </a:gs>
+          </a:gsLst>
+          <a:lin ang="5400000" scaled="0"/>
+        </a:gradFill>
+      </a:fillStyleLst>
+      <a:lnStyleLst>
+        <a:ln w="12700" cap="flat" cmpd="sng" algn="ctr">
+          <a:solidFill>
+            <a:schemeClr val="phClr"/>
+          </a:solidFill>
+          <a:prstDash val="solid"/>
+          <a:miter lim="800000"/>
+        </a:ln>
+        <a:ln w="19050" cap="flat" cmpd="sng" algn="ctr">
+          <a:solidFill>
+            <a:schemeClr val="phClr"/>
+          </a:solidFill>
+          <a:prstDash val="solid"/>
+          <a:miter lim="800000"/>
+        </a:ln>
+        <a:ln w="25400" cap="flat" cmpd="sng" algn="ctr">
+          <a:solidFill>
+            <a:schemeClr val="phClr"/>
+          </a:solidFill>
+          <a:prstDash val="solid"/>
+          <a:miter lim="800000"/>
+        </a:ln>
+      </a:lnStyleLst>
+      <a:effectStyleLst>
+        <a:effectStyle>
+          <a:effectLst/>
+        </a:effectStyle>
+        <a:effectStyle>
+          <a:effectLst/>
+        </a:effectStyle>
+        <a:effectStyle>
+          <a:effectLst>
+            <a:outerShdw blurRad="57150" dist="19050" dir="5400000" algn="ctr" rotWithShape="0">
+              <a:srgbClr val="000000">
+                <a:alpha val="63000"/>
+              </a:srgbClr>
+            </a:outerShdw>
+          </a:effectLst>
+        </a:effectStyle>
+      </a:effectStyleLst>
+      <a:bgFillStyleLst>
+        <a:solidFill>
+          <a:schemeClr val="phClr"/>
+        </a:solidFill>
+        <a:solidFill>
+          <a:schemeClr val="phClr">
+            <a:tint val="95000"/>
+            <a:satMod val="170000"/>
+          </a:schemeClr>
+        </a:solidFill>
+        <a:gradFill rotWithShape="1">
+          <a:gsLst>
+            <a:gs pos="0">
+              <a:schemeClr val="phClr">
+                <a:tint val="93000"/>
+                <a:satMod val="150000"/>
+                <a:shade val="98000"/>
+                <a:lumMod val="102000"/>
+              </a:schemeClr>
+            </a:gs>
+            <a:gs pos="50000">
+              <a:schemeClr val="phClr">
+                <a:tint val="98000"/>
+                <a:satMod val="130000"/>
+                <a:shade val="90000"/>
+                <a:lumMod val="103000"/>
+              </a:schemeClr>
+            </a:gs>
+            <a:gs pos="100000">
+              <a:schemeClr val="phClr">
+                <a:shade val="63000"/>
+                <a:satMod val="120000"/>
+              </a:schemeClr>
+            </a:gs>
+          </a:gsLst>
+          <a:lin ang="5400000" scaled="0"/>
+        </a:gradFill>
+      </a:bgFillStyleLst>
+    </a:fmtScheme>
+  </a:themeElements>
+  <a:objectDefaults>
+    <a:lnDef>
+      <a:spPr/>
+      <a:bodyPr/>
+      <a:lstStyle/>
+      <a:style>
+        <a:lnRef idx="2">
+          <a:schemeClr val="accent1"/>
+        </a:lnRef>
+        <a:fillRef idx="0">
+          <a:schemeClr val="accent1"/>
+        </a:fillRef>
+        <a:effectRef idx="1">
+          <a:schemeClr val="accent1"/>
+        </a:effectRef>
+        <a:fontRef idx="minor">
+          <a:schemeClr val="tx1"/>
+        </a:fontRef>
+      </a:style>
+    </a:lnDef>
+  </a:objectDefaults>
+  <a:extraClrSchemeLst/>
+  <a:extLst>
+    <a:ext uri="{05A4C25C-085E-4340-85A3-A5531E510DB2}">
+      <thm15:themeFamily xmlns:thm15="http://schemas.microsoft.com/office/thememl/2012/main" name="Office Theme" id="{2E142A2C-CD16-42D6-873A-C26D2A0506FA}" vid="{1BDDFF52-6CD6-40A5-AB3C-68EB2F1E4D0A}"/>
+    </a:ext>
+  </a:extLst>
+</a:theme>
 </file>
</xml_diff>